<commit_message>
+) Updated sad slides
</commit_message>
<xml_diff>
--- a/2nd_sem/sad/murrent_grill_pieber_lehner/presentations/EVA_design_v1.pptx
+++ b/2nd_sem/sad/murrent_grill_pieber_lehner/presentations/EVA_design_v1.pptx
@@ -6,13 +6,16 @@
     <p:sldMasterId id="2147483852" r:id="rId3"/>
   </p:sldMasterIdLst>
   <p:notesMasterIdLst>
-    <p:notesMasterId r:id="rId5"/>
+    <p:notesMasterId r:id="rId8"/>
   </p:notesMasterIdLst>
   <p:handoutMasterIdLst>
-    <p:handoutMasterId r:id="rId6"/>
+    <p:handoutMasterId r:id="rId9"/>
   </p:handoutMasterIdLst>
   <p:sldIdLst>
     <p:sldId id="257" r:id="rId4"/>
+    <p:sldId id="258" r:id="rId5"/>
+    <p:sldId id="259" r:id="rId6"/>
+    <p:sldId id="260" r:id="rId7"/>
   </p:sldIdLst>
   <p:sldSz cx="12192000" cy="6858000"/>
   <p:notesSz cx="6858000" cy="9144000"/>
@@ -1017,13 +1020,18 @@
         <a:lstStyle/>
         <a:p>
           <a:r>
-            <a:rPr lang="de-DE" sz="1400" b="0" i="0">
+            <a:rPr lang="de-DE" sz="1400" b="0" i="0" dirty="0" smtClean="0">
               <a:latin typeface="Century Gothic"/>
               <a:ea typeface="+mn-ea"/>
               <a:cs typeface="+mn-cs"/>
             </a:rPr>
-            <a:t>Planen</a:t>
+            <a:t>Kontextabgrenzung</a:t>
           </a:r>
+          <a:endParaRPr lang="de-DE" sz="1400" b="0" i="0" dirty="0">
+            <a:latin typeface="Century Gothic"/>
+            <a:ea typeface="+mn-ea"/>
+            <a:cs typeface="+mn-cs"/>
+          </a:endParaRPr>
         </a:p>
       </dgm:t>
     </dgm:pt>
@@ -1062,13 +1070,18 @@
         <a:lstStyle/>
         <a:p>
           <a:r>
-            <a:rPr lang="de-DE" sz="1400" b="0" i="0">
+            <a:rPr lang="de-DE" sz="1400" b="0" i="0" dirty="0" smtClean="0">
               <a:latin typeface="Century Gothic"/>
               <a:ea typeface="+mn-ea"/>
               <a:cs typeface="+mn-cs"/>
             </a:rPr>
-            <a:t>Entwickeln</a:t>
+            <a:t>Bausteinsicht</a:t>
           </a:r>
+          <a:endParaRPr lang="de-DE" sz="1400" b="0" i="0" dirty="0">
+            <a:latin typeface="Century Gothic"/>
+            <a:ea typeface="+mn-ea"/>
+            <a:cs typeface="+mn-cs"/>
+          </a:endParaRPr>
         </a:p>
       </dgm:t>
     </dgm:pt>
@@ -1107,13 +1120,18 @@
         <a:lstStyle/>
         <a:p>
           <a:r>
-            <a:rPr lang="de-DE" sz="1400" b="0" i="0">
+            <a:rPr lang="de-DE" sz="1400" b="0" i="0" dirty="0" smtClean="0">
               <a:latin typeface="Century Gothic"/>
               <a:ea typeface="+mn-ea"/>
               <a:cs typeface="+mn-cs"/>
             </a:rPr>
-            <a:t>Testen</a:t>
+            <a:t>Laufzeitsicht</a:t>
           </a:r>
+          <a:endParaRPr lang="de-DE" sz="1400" b="0" i="0" dirty="0">
+            <a:latin typeface="Century Gothic"/>
+            <a:ea typeface="+mn-ea"/>
+            <a:cs typeface="+mn-cs"/>
+          </a:endParaRPr>
         </a:p>
       </dgm:t>
     </dgm:pt>
@@ -1129,51 +1147,6 @@
       </dgm:t>
     </dgm:pt>
     <dgm:pt modelId="{E322421D-E49C-4213-8E54-92B0A3C2AA0D}" type="sibTrans" cxnId="{8D5FD78A-BE31-4FDE-A461-DA8AB34B38C6}">
-      <dgm:prSet/>
-      <dgm:spPr/>
-      <dgm:t>
-        <a:bodyPr/>
-        <a:lstStyle/>
-        <a:p>
-          <a:endParaRPr lang="en-US"/>
-        </a:p>
-      </dgm:t>
-    </dgm:pt>
-    <dgm:pt modelId="{2047DE55-99B8-4790-89E2-F50A652A554B}">
-      <dgm:prSet phldrT="[Text]" custT="1"/>
-      <dgm:spPr>
-        <a:xfrm>
-          <a:off x="787991" y="4160573"/>
-          <a:ext cx="1433405" cy="1036336"/>
-        </a:xfrm>
-      </dgm:spPr>
-      <dgm:t>
-        <a:bodyPr/>
-        <a:lstStyle/>
-        <a:p>
-          <a:r>
-            <a:rPr lang="de-DE" sz="1400" b="0" i="0" dirty="0">
-              <a:latin typeface="Century Gothic"/>
-              <a:ea typeface="+mn-ea"/>
-              <a:cs typeface="+mn-cs"/>
-            </a:rPr>
-            <a:t>Analysieren</a:t>
-          </a:r>
-        </a:p>
-      </dgm:t>
-    </dgm:pt>
-    <dgm:pt modelId="{C8D3E9CF-05DC-4FB6-BC89-86896EE18DEA}" type="parTrans" cxnId="{721A35C3-DBEA-42F4-A54D-DFAAD999BF91}">
-      <dgm:prSet/>
-      <dgm:spPr/>
-      <dgm:t>
-        <a:bodyPr/>
-        <a:lstStyle/>
-        <a:p>
-          <a:endParaRPr lang="en-US"/>
-        </a:p>
-      </dgm:t>
-    </dgm:pt>
-    <dgm:pt modelId="{048493D6-4426-4618-8C32-1CBA84A9753C}" type="sibTrans" cxnId="{721A35C3-DBEA-42F4-A54D-DFAAD999BF91}">
       <dgm:prSet/>
       <dgm:spPr/>
       <dgm:t>
@@ -1246,7 +1219,7 @@
       </dgm:t>
     </dgm:pt>
     <dgm:pt modelId="{A641F8A4-CF11-4116-B4E6-8425449904ED}" type="pres">
-      <dgm:prSet presAssocID="{D2FE3027-CD5C-42F2-91EB-86FAC3E4BE0B}" presName="Image1" presStyleLbl="fgImgPlace1" presStyleIdx="0" presStyleCnt="4"/>
+      <dgm:prSet presAssocID="{D2FE3027-CD5C-42F2-91EB-86FAC3E4BE0B}" presName="Image1" presStyleLbl="fgImgPlace1" presStyleIdx="0" presStyleCnt="3"/>
       <dgm:spPr>
         <a:xfrm>
           <a:off x="2302954" y="643876"/>
@@ -1255,37 +1228,32 @@
         <a:prstGeom prst="ellipse">
           <a:avLst/>
         </a:prstGeom>
-        <a:blipFill dpi="0" rotWithShape="1">
-          <a:blip xmlns:r="http://schemas.openxmlformats.org/officeDocument/2006/relationships" r:embed="rId1" cstate="print">
-            <a:duotone>
-              <a:schemeClr val="dk2">
-                <a:hueOff val="0"/>
-                <a:satOff val="0"/>
-                <a:lumOff val="0"/>
-                <a:alphaOff val="0"/>
-                <a:shade val="20000"/>
-                <a:satMod val="200000"/>
-              </a:schemeClr>
-              <a:schemeClr val="dk2">
-                <a:hueOff val="0"/>
-                <a:satOff val="0"/>
-                <a:lumOff val="0"/>
-                <a:alphaOff val="0"/>
-                <a:tint val="12000"/>
-                <a:satMod val="190000"/>
-              </a:schemeClr>
-            </a:duotone>
+        <a:blipFill>
+          <a:blip xmlns:r="http://schemas.openxmlformats.org/officeDocument/2006/relationships" r:embed="rId1">
             <a:extLst>
+              <a:ext uri="{BEBA8EAE-BF5A-486C-A8C5-ECC9F3942E4B}">
+                <a14:imgProps xmlns:a14="http://schemas.microsoft.com/office/drawing/2010/main">
+                  <a14:imgLayer r:embed="rId2">
+                    <a14:imgEffect>
+                      <a14:saturation sat="400000"/>
+                    </a14:imgEffect>
+                  </a14:imgLayer>
+                </a14:imgProps>
+              </a:ext>
               <a:ext uri="{28A0092B-C50C-407E-A947-70E740481C1C}">
                 <a14:useLocalDpi xmlns:a14="http://schemas.microsoft.com/office/drawing/2010/main" val="0"/>
               </a:ext>
             </a:extLst>
           </a:blip>
-          <a:srcRect/>
           <a:stretch>
-            <a:fillRect/>
+            <a:fillRect l="-189000" r="-189000"/>
           </a:stretch>
         </a:blipFill>
+        <a:effectLst>
+          <a:glow>
+            <a:schemeClr val="accent1"/>
+          </a:glow>
+        </a:effectLst>
       </dgm:spPr>
       <dgm:t>
         <a:bodyPr/>
@@ -1296,7 +1264,7 @@
       </dgm:t>
     </dgm:pt>
     <dgm:pt modelId="{4E1806DE-992B-4280-BAAA-DE6487DCDC77}" type="pres">
-      <dgm:prSet presAssocID="{D2FE3027-CD5C-42F2-91EB-86FAC3E4BE0B}" presName="Child1" presStyleLbl="revTx" presStyleIdx="0" presStyleCnt="4">
+      <dgm:prSet presAssocID="{D2FE3027-CD5C-42F2-91EB-86FAC3E4BE0B}" presName="Child1" presStyleLbl="revTx" presStyleIdx="0" presStyleCnt="3" custScaleX="153125" custLinFactNeighborX="-31860">
         <dgm:presLayoutVars>
           <dgm:chMax val="0"/>
           <dgm:chPref val="0"/>
@@ -1328,7 +1296,7 @@
       </dgm:t>
     </dgm:pt>
     <dgm:pt modelId="{7ACA9D6E-B4F2-44F7-ADFA-C71D9AD1611D}" type="pres">
-      <dgm:prSet presAssocID="{960DD3F4-08B5-4717-B21F-9D7ADE4F9398}" presName="Image" presStyleLbl="fgImgPlace1" presStyleIdx="1" presStyleCnt="4"/>
+      <dgm:prSet presAssocID="{960DD3F4-08B5-4717-B21F-9D7ADE4F9398}" presName="Image" presStyleLbl="fgImgPlace1" presStyleIdx="1" presStyleCnt="3"/>
       <dgm:spPr>
         <a:xfrm>
           <a:off x="1512028" y="1640951"/>
@@ -1337,26 +1305,8 @@
         <a:prstGeom prst="ellipse">
           <a:avLst/>
         </a:prstGeom>
-        <a:blipFill dpi="0" rotWithShape="1">
-          <a:blip xmlns:r="http://schemas.openxmlformats.org/officeDocument/2006/relationships" r:embed="rId2" cstate="print">
-            <a:duotone>
-              <a:schemeClr val="dk2">
-                <a:hueOff val="0"/>
-                <a:satOff val="0"/>
-                <a:lumOff val="0"/>
-                <a:alphaOff val="0"/>
-                <a:shade val="20000"/>
-                <a:satMod val="200000"/>
-              </a:schemeClr>
-              <a:schemeClr val="dk2">
-                <a:hueOff val="0"/>
-                <a:satOff val="0"/>
-                <a:lumOff val="0"/>
-                <a:alphaOff val="0"/>
-                <a:tint val="12000"/>
-                <a:satMod val="190000"/>
-              </a:schemeClr>
-            </a:duotone>
+        <a:blipFill>
+          <a:blip xmlns:r="http://schemas.openxmlformats.org/officeDocument/2006/relationships" r:embed="rId3">
             <a:extLst>
               <a:ext uri="{28A0092B-C50C-407E-A947-70E740481C1C}">
                 <a14:useLocalDpi xmlns:a14="http://schemas.microsoft.com/office/drawing/2010/main" val="0"/>
@@ -1365,7 +1315,7 @@
           </a:blip>
           <a:srcRect/>
           <a:stretch>
-            <a:fillRect/>
+            <a:fillRect l="-40000" r="-40000"/>
           </a:stretch>
         </a:blipFill>
       </dgm:spPr>
@@ -1378,7 +1328,7 @@
       </dgm:t>
     </dgm:pt>
     <dgm:pt modelId="{63748CBD-72AB-475B-93BB-2E1E19EB7CDF}" type="pres">
-      <dgm:prSet presAssocID="{960DD3F4-08B5-4717-B21F-9D7ADE4F9398}" presName="Child2" presStyleLbl="revTx" presStyleIdx="1" presStyleCnt="4">
+      <dgm:prSet presAssocID="{960DD3F4-08B5-4717-B21F-9D7ADE4F9398}" presName="Child2" presStyleLbl="revTx" presStyleIdx="1" presStyleCnt="3">
         <dgm:presLayoutVars>
           <dgm:chMax val="0"/>
           <dgm:chPref val="0"/>
@@ -1410,7 +1360,7 @@
       </dgm:t>
     </dgm:pt>
     <dgm:pt modelId="{07F3DE25-1642-45C2-B4F6-1F381AF4B3C9}" type="pres">
-      <dgm:prSet presAssocID="{C0C01B88-9CE1-468B-9CBF-591339763F40}" presName="Image" presStyleLbl="fgImgPlace1" presStyleIdx="2" presStyleCnt="4"/>
+      <dgm:prSet presAssocID="{C0C01B88-9CE1-468B-9CBF-591339763F40}" presName="Image" presStyleLbl="fgImgPlace1" presStyleIdx="2" presStyleCnt="3"/>
       <dgm:spPr>
         <a:xfrm>
           <a:off x="1516136" y="3106888"/>
@@ -1419,26 +1369,8 @@
         <a:prstGeom prst="ellipse">
           <a:avLst/>
         </a:prstGeom>
-        <a:blipFill dpi="0" rotWithShape="1">
-          <a:blip xmlns:r="http://schemas.openxmlformats.org/officeDocument/2006/relationships" r:embed="rId3" cstate="print">
-            <a:duotone>
-              <a:schemeClr val="dk2">
-                <a:hueOff val="0"/>
-                <a:satOff val="0"/>
-                <a:lumOff val="0"/>
-                <a:alphaOff val="0"/>
-                <a:shade val="20000"/>
-                <a:satMod val="200000"/>
-              </a:schemeClr>
-              <a:schemeClr val="dk2">
-                <a:hueOff val="0"/>
-                <a:satOff val="0"/>
-                <a:lumOff val="0"/>
-                <a:alphaOff val="0"/>
-                <a:tint val="12000"/>
-                <a:satMod val="190000"/>
-              </a:schemeClr>
-            </a:duotone>
+        <a:blipFill>
+          <a:blip xmlns:r="http://schemas.openxmlformats.org/officeDocument/2006/relationships" r:embed="rId4" cstate="print">
             <a:extLst>
               <a:ext uri="{28A0092B-C50C-407E-A947-70E740481C1C}">
                 <a14:useLocalDpi xmlns:a14="http://schemas.microsoft.com/office/drawing/2010/main" val="0"/>
@@ -1447,7 +1379,7 @@
           </a:blip>
           <a:srcRect/>
           <a:stretch>
-            <a:fillRect/>
+            <a:fillRect t="-1000" b="-1000"/>
           </a:stretch>
         </a:blipFill>
       </dgm:spPr>
@@ -1460,89 +1392,7 @@
       </dgm:t>
     </dgm:pt>
     <dgm:pt modelId="{24DAAE03-8AA3-4374-B236-819FD4BAD3C8}" type="pres">
-      <dgm:prSet presAssocID="{C0C01B88-9CE1-468B-9CBF-591339763F40}" presName="Child3" presStyleLbl="revTx" presStyleIdx="2" presStyleCnt="4">
-        <dgm:presLayoutVars>
-          <dgm:chMax val="0"/>
-          <dgm:chPref val="0"/>
-          <dgm:bulletEnabled val="1"/>
-        </dgm:presLayoutVars>
-      </dgm:prSet>
-      <dgm:spPr>
-        <a:prstGeom prst="rect">
-          <a:avLst/>
-        </a:prstGeom>
-      </dgm:spPr>
-      <dgm:t>
-        <a:bodyPr/>
-        <a:lstStyle/>
-        <a:p>
-          <a:endParaRPr lang="en-US"/>
-        </a:p>
-      </dgm:t>
-    </dgm:pt>
-    <dgm:pt modelId="{372EC7E2-032F-493E-9422-3E6BBF84C804}" type="pres">
-      <dgm:prSet presAssocID="{2047DE55-99B8-4790-89E2-F50A652A554B}" presName="Image4" presStyleCnt="0"/>
-      <dgm:spPr/>
-      <dgm:t>
-        <a:bodyPr/>
-        <a:lstStyle/>
-        <a:p>
-          <a:endParaRPr lang="en-US"/>
-        </a:p>
-      </dgm:t>
-    </dgm:pt>
-    <dgm:pt modelId="{37E17C6F-ED68-448D-88C1-BFA2E9B6DD18}" type="pres">
-      <dgm:prSet presAssocID="{2047DE55-99B8-4790-89E2-F50A652A554B}" presName="Image" presStyleLbl="fgImgPlace1" presStyleIdx="3" presStyleCnt="4"/>
-      <dgm:spPr>
-        <a:xfrm>
-          <a:off x="2302954" y="4138659"/>
-          <a:ext cx="1070800" cy="1070576"/>
-        </a:xfrm>
-        <a:prstGeom prst="ellipse">
-          <a:avLst/>
-        </a:prstGeom>
-        <a:blipFill dpi="0" rotWithShape="1">
-          <a:blip xmlns:r="http://schemas.openxmlformats.org/officeDocument/2006/relationships" r:embed="rId4" cstate="print">
-            <a:duotone>
-              <a:schemeClr val="dk2">
-                <a:hueOff val="0"/>
-                <a:satOff val="0"/>
-                <a:lumOff val="0"/>
-                <a:alphaOff val="0"/>
-                <a:shade val="20000"/>
-                <a:satMod val="200000"/>
-              </a:schemeClr>
-              <a:schemeClr val="dk2">
-                <a:hueOff val="0"/>
-                <a:satOff val="0"/>
-                <a:lumOff val="0"/>
-                <a:alphaOff val="0"/>
-                <a:tint val="12000"/>
-                <a:satMod val="190000"/>
-              </a:schemeClr>
-            </a:duotone>
-            <a:extLst>
-              <a:ext uri="{28A0092B-C50C-407E-A947-70E740481C1C}">
-                <a14:useLocalDpi xmlns:a14="http://schemas.microsoft.com/office/drawing/2010/main" val="0"/>
-              </a:ext>
-            </a:extLst>
-          </a:blip>
-          <a:srcRect/>
-          <a:stretch>
-            <a:fillRect/>
-          </a:stretch>
-        </a:blipFill>
-      </dgm:spPr>
-      <dgm:t>
-        <a:bodyPr/>
-        <a:lstStyle/>
-        <a:p>
-          <a:endParaRPr lang="en-US"/>
-        </a:p>
-      </dgm:t>
-    </dgm:pt>
-    <dgm:pt modelId="{9658C117-7785-4D2C-B987-9EA97BF9F6B2}" type="pres">
-      <dgm:prSet presAssocID="{2047DE55-99B8-4790-89E2-F50A652A554B}" presName="Child4" presStyleLbl="revTx" presStyleIdx="3" presStyleCnt="4">
+      <dgm:prSet presAssocID="{C0C01B88-9CE1-468B-9CBF-591339763F40}" presName="Child3" presStyleLbl="revTx" presStyleIdx="2" presStyleCnt="3">
         <dgm:presLayoutVars>
           <dgm:chMax val="0"/>
           <dgm:chPref val="0"/>
@@ -1564,17 +1414,15 @@
     </dgm:pt>
   </dgm:ptLst>
   <dgm:cxnLst>
-    <dgm:cxn modelId="{D9E9AF51-814D-44BB-8C4A-65FE7EBF397A}" type="presOf" srcId="{2047DE55-99B8-4790-89E2-F50A652A554B}" destId="{9658C117-7785-4D2C-B987-9EA97BF9F6B2}" srcOrd="0" destOrd="0" presId="urn:microsoft.com/office/officeart/2011/layout/RadialPictureList#1"/>
+    <dgm:cxn modelId="{A971AD42-BB12-4E5C-BD90-DB7621320F5D}" srcId="{E16905CA-DEF8-4D11-8E8E-35415FE5B980}" destId="{007470A2-B5D7-4887-B4FD-B6021A4D4CF7}" srcOrd="0" destOrd="0" parTransId="{C7FB72E2-A81D-4936-94C5-846F95D01B10}" sibTransId="{36A13DC7-7A59-4D72-A36F-54543C02182F}"/>
+    <dgm:cxn modelId="{9E4E2731-40FC-4C8C-BD87-233E2714803D}" type="presOf" srcId="{960DD3F4-08B5-4717-B21F-9D7ADE4F9398}" destId="{63748CBD-72AB-475B-93BB-2E1E19EB7CDF}" srcOrd="0" destOrd="0" presId="urn:microsoft.com/office/officeart/2011/layout/RadialPictureList#1"/>
+    <dgm:cxn modelId="{2F708DD1-31DA-40F2-8F61-60D64D9DED0E}" srcId="{007470A2-B5D7-4887-B4FD-B6021A4D4CF7}" destId="{D2FE3027-CD5C-42F2-91EB-86FAC3E4BE0B}" srcOrd="0" destOrd="0" parTransId="{D970ABB7-5E37-4C46-AB28-EAAE4C62AF1F}" sibTransId="{3BD032F4-74D8-4DF5-A3F7-BE4B5F10D5BF}"/>
     <dgm:cxn modelId="{9C2E042D-CC64-4CEE-B92A-1460AAE50926}" type="presOf" srcId="{C0C01B88-9CE1-468B-9CBF-591339763F40}" destId="{24DAAE03-8AA3-4374-B236-819FD4BAD3C8}" srcOrd="0" destOrd="0" presId="urn:microsoft.com/office/officeart/2011/layout/RadialPictureList#1"/>
     <dgm:cxn modelId="{7A61EFD5-591C-4604-9A8A-367CEFB1478D}" type="presOf" srcId="{007470A2-B5D7-4887-B4FD-B6021A4D4CF7}" destId="{05E59EE6-24A2-4651-996A-9AFB7B9FFC8F}" srcOrd="0" destOrd="0" presId="urn:microsoft.com/office/officeart/2011/layout/RadialPictureList#1"/>
-    <dgm:cxn modelId="{9E4E2731-40FC-4C8C-BD87-233E2714803D}" type="presOf" srcId="{960DD3F4-08B5-4717-B21F-9D7ADE4F9398}" destId="{63748CBD-72AB-475B-93BB-2E1E19EB7CDF}" srcOrd="0" destOrd="0" presId="urn:microsoft.com/office/officeart/2011/layout/RadialPictureList#1"/>
-    <dgm:cxn modelId="{F0B079DC-9100-43CB-83F4-47AC9676D6D6}" srcId="{007470A2-B5D7-4887-B4FD-B6021A4D4CF7}" destId="{960DD3F4-08B5-4717-B21F-9D7ADE4F9398}" srcOrd="1" destOrd="0" parTransId="{839A0E79-83CF-4D81-910F-C4D38D5DC2A9}" sibTransId="{D3D2787D-6A77-4635-9E00-A1E2766D7996}"/>
-    <dgm:cxn modelId="{721A35C3-DBEA-42F4-A54D-DFAAD999BF91}" srcId="{007470A2-B5D7-4887-B4FD-B6021A4D4CF7}" destId="{2047DE55-99B8-4790-89E2-F50A652A554B}" srcOrd="3" destOrd="0" parTransId="{C8D3E9CF-05DC-4FB6-BC89-86896EE18DEA}" sibTransId="{048493D6-4426-4618-8C32-1CBA84A9753C}"/>
-    <dgm:cxn modelId="{A971AD42-BB12-4E5C-BD90-DB7621320F5D}" srcId="{E16905CA-DEF8-4D11-8E8E-35415FE5B980}" destId="{007470A2-B5D7-4887-B4FD-B6021A4D4CF7}" srcOrd="0" destOrd="0" parTransId="{C7FB72E2-A81D-4936-94C5-846F95D01B10}" sibTransId="{36A13DC7-7A59-4D72-A36F-54543C02182F}"/>
     <dgm:cxn modelId="{B12CE0AB-E58C-49E1-8188-168DF2948C30}" type="presOf" srcId="{E16905CA-DEF8-4D11-8E8E-35415FE5B980}" destId="{BCBA671E-8B0E-47E3-B726-8B2B073B000E}" srcOrd="0" destOrd="0" presId="urn:microsoft.com/office/officeart/2011/layout/RadialPictureList#1"/>
     <dgm:cxn modelId="{8D5FD78A-BE31-4FDE-A461-DA8AB34B38C6}" srcId="{007470A2-B5D7-4887-B4FD-B6021A4D4CF7}" destId="{C0C01B88-9CE1-468B-9CBF-591339763F40}" srcOrd="2" destOrd="0" parTransId="{DFE94F7E-D535-430A-8BB1-49AC9838F4B9}" sibTransId="{E322421D-E49C-4213-8E54-92B0A3C2AA0D}"/>
     <dgm:cxn modelId="{ACF4374D-E79C-4718-965B-D6EFFC274089}" type="presOf" srcId="{D2FE3027-CD5C-42F2-91EB-86FAC3E4BE0B}" destId="{4E1806DE-992B-4280-BAAA-DE6487DCDC77}" srcOrd="0" destOrd="0" presId="urn:microsoft.com/office/officeart/2011/layout/RadialPictureList#1"/>
-    <dgm:cxn modelId="{2F708DD1-31DA-40F2-8F61-60D64D9DED0E}" srcId="{007470A2-B5D7-4887-B4FD-B6021A4D4CF7}" destId="{D2FE3027-CD5C-42F2-91EB-86FAC3E4BE0B}" srcOrd="0" destOrd="0" parTransId="{D970ABB7-5E37-4C46-AB28-EAAE4C62AF1F}" sibTransId="{3BD032F4-74D8-4DF5-A3F7-BE4B5F10D5BF}"/>
+    <dgm:cxn modelId="{F0B079DC-9100-43CB-83F4-47AC9676D6D6}" srcId="{007470A2-B5D7-4887-B4FD-B6021A4D4CF7}" destId="{960DD3F4-08B5-4717-B21F-9D7ADE4F9398}" srcOrd="1" destOrd="0" parTransId="{839A0E79-83CF-4D81-910F-C4D38D5DC2A9}" sibTransId="{D3D2787D-6A77-4635-9E00-A1E2766D7996}"/>
     <dgm:cxn modelId="{34874735-1C19-4F88-975D-6E0C7C740B29}" type="presParOf" srcId="{BCBA671E-8B0E-47E3-B726-8B2B073B000E}" destId="{05E59EE6-24A2-4651-996A-9AFB7B9FFC8F}" srcOrd="0" destOrd="0" presId="urn:microsoft.com/office/officeart/2011/layout/RadialPictureList#1"/>
     <dgm:cxn modelId="{D3345169-6B1D-496E-9EDA-4A5C622E31E4}" type="presParOf" srcId="{BCBA671E-8B0E-47E3-B726-8B2B073B000E}" destId="{1EA0B330-A62A-423B-9436-56354426AF14}" srcOrd="1" destOrd="0" presId="urn:microsoft.com/office/officeart/2011/layout/RadialPictureList#1"/>
     <dgm:cxn modelId="{C3147F90-5274-4109-B556-1FB609EFACE2}" type="presParOf" srcId="{BCBA671E-8B0E-47E3-B726-8B2B073B000E}" destId="{A641F8A4-CF11-4116-B4E6-8425449904ED}" srcOrd="2" destOrd="0" presId="urn:microsoft.com/office/officeart/2011/layout/RadialPictureList#1"/>
@@ -1585,9 +1433,6 @@
     <dgm:cxn modelId="{F903D158-0AE5-4966-BE2C-A4C61B4FADF4}" type="presParOf" srcId="{BCBA671E-8B0E-47E3-B726-8B2B073B000E}" destId="{EA3FBB46-60CA-4DCD-B01B-F2EAC10C3D89}" srcOrd="6" destOrd="0" presId="urn:microsoft.com/office/officeart/2011/layout/RadialPictureList#1"/>
     <dgm:cxn modelId="{D73ED48E-1782-4BBC-A58B-191B0E421C53}" type="presParOf" srcId="{EA3FBB46-60CA-4DCD-B01B-F2EAC10C3D89}" destId="{07F3DE25-1642-45C2-B4F6-1F381AF4B3C9}" srcOrd="0" destOrd="0" presId="urn:microsoft.com/office/officeart/2011/layout/RadialPictureList#1"/>
     <dgm:cxn modelId="{B883E3DB-3EFD-4405-8F95-F270A7711FD4}" type="presParOf" srcId="{BCBA671E-8B0E-47E3-B726-8B2B073B000E}" destId="{24DAAE03-8AA3-4374-B236-819FD4BAD3C8}" srcOrd="7" destOrd="0" presId="urn:microsoft.com/office/officeart/2011/layout/RadialPictureList#1"/>
-    <dgm:cxn modelId="{09661205-3673-4916-9853-15BEB71BAFD3}" type="presParOf" srcId="{BCBA671E-8B0E-47E3-B726-8B2B073B000E}" destId="{372EC7E2-032F-493E-9422-3E6BBF84C804}" srcOrd="8" destOrd="0" presId="urn:microsoft.com/office/officeart/2011/layout/RadialPictureList#1"/>
-    <dgm:cxn modelId="{23C63004-A06D-4787-A3CF-FA1088AB4C22}" type="presParOf" srcId="{372EC7E2-032F-493E-9422-3E6BBF84C804}" destId="{37E17C6F-ED68-448D-88C1-BFA2E9B6DD18}" srcOrd="0" destOrd="0" presId="urn:microsoft.com/office/officeart/2011/layout/RadialPictureList#1"/>
-    <dgm:cxn modelId="{430378F9-C108-41BB-8168-CA4B5F5D2693}" type="presParOf" srcId="{BCBA671E-8B0E-47E3-B726-8B2B073B000E}" destId="{9658C117-7785-4D2C-B987-9EA97BF9F6B2}" srcOrd="9" destOrd="0" presId="urn:microsoft.com/office/officeart/2011/layout/RadialPictureList#1"/>
   </dgm:cxnLst>
   <dgm:bg>
     <a:noFill/>
@@ -1630,8 +1475,8 @@
       </dsp:nvSpPr>
       <dsp:spPr>
         <a:xfrm>
-          <a:off x="4023215" y="1173602"/>
-          <a:ext cx="2423509" cy="2423313"/>
+          <a:off x="4058886" y="1087958"/>
+          <a:ext cx="2634653" cy="2634806"/>
         </a:xfrm>
         <a:prstGeom prst="ellipse">
           <a:avLst/>
@@ -1719,8 +1564,8 @@
         </a:p>
       </dsp:txBody>
       <dsp:txXfrm>
-        <a:off x="4378130" y="1528488"/>
-        <a:ext cx="1713679" cy="1713541"/>
+        <a:off x="4444722" y="1473816"/>
+        <a:ext cx="1862981" cy="1863090"/>
       </dsp:txXfrm>
     </dsp:sp>
     <dsp:sp modelId="{1EA0B330-A62A-423B-9436-56354426AF14}">
@@ -1730,8 +1575,8 @@
       </dsp:nvSpPr>
       <dsp:spPr>
         <a:xfrm rot="10800000">
-          <a:off x="3139813" y="172785"/>
-          <a:ext cx="4222915" cy="4401972"/>
+          <a:off x="3098179" y="0"/>
+          <a:ext cx="4591454" cy="4786313"/>
         </a:xfrm>
         <a:prstGeom prst="blockArc">
           <a:avLst>
@@ -1798,52 +1643,40 @@
       </dsp:nvSpPr>
       <dsp:spPr>
         <a:xfrm>
-          <a:off x="3625771" y="0"/>
-          <a:ext cx="1122624" cy="1122390"/>
+          <a:off x="3088651" y="403486"/>
+          <a:ext cx="1220168" cy="1220509"/>
         </a:xfrm>
         <a:prstGeom prst="ellipse">
           <a:avLst/>
         </a:prstGeom>
-        <a:blipFill dpi="0" rotWithShape="1">
-          <a:blip xmlns:r="http://schemas.openxmlformats.org/officeDocument/2006/relationships" r:embed="rId1" cstate="print">
-            <a:duotone>
-              <a:schemeClr val="dk2">
-                <a:hueOff val="0"/>
-                <a:satOff val="0"/>
-                <a:lumOff val="0"/>
-                <a:alphaOff val="0"/>
-                <a:shade val="20000"/>
-                <a:satMod val="200000"/>
-              </a:schemeClr>
-              <a:schemeClr val="dk2">
-                <a:hueOff val="0"/>
-                <a:satOff val="0"/>
-                <a:lumOff val="0"/>
-                <a:alphaOff val="0"/>
-                <a:tint val="12000"/>
-                <a:satMod val="190000"/>
-              </a:schemeClr>
-            </a:duotone>
+        <a:blipFill>
+          <a:blip xmlns:r="http://schemas.openxmlformats.org/officeDocument/2006/relationships" r:embed="rId1">
             <a:extLst>
+              <a:ext uri="{BEBA8EAE-BF5A-486C-A8C5-ECC9F3942E4B}">
+                <a14:imgProps xmlns:a14="http://schemas.microsoft.com/office/drawing/2010/main">
+                  <a14:imgLayer r:embed="rId2">
+                    <a14:imgEffect>
+                      <a14:saturation sat="400000"/>
+                    </a14:imgEffect>
+                  </a14:imgLayer>
+                </a14:imgProps>
+              </a:ext>
               <a:ext uri="{28A0092B-C50C-407E-A947-70E740481C1C}">
                 <a14:useLocalDpi xmlns:a14="http://schemas.microsoft.com/office/drawing/2010/main" val="0"/>
               </a:ext>
             </a:extLst>
           </a:blip>
-          <a:srcRect/>
           <a:stretch>
-            <a:fillRect/>
+            <a:fillRect l="-189000" r="-189000"/>
           </a:stretch>
         </a:blipFill>
         <a:ln>
           <a:noFill/>
         </a:ln>
         <a:effectLst>
-          <a:outerShdw blurRad="38100" dist="25400" dir="5400000" rotWithShape="0">
-            <a:srgbClr val="000000">
-              <a:alpha val="45000"/>
-            </a:srgbClr>
-          </a:outerShdw>
+          <a:glow>
+            <a:schemeClr val="accent1"/>
+          </a:glow>
         </a:effectLst>
       </dsp:spPr>
       <dsp:style>
@@ -1866,8 +1699,8 @@
       </dsp:nvSpPr>
       <dsp:spPr>
         <a:xfrm>
-          <a:off x="2037488" y="14358"/>
-          <a:ext cx="1502779" cy="1086493"/>
+          <a:off x="408676" y="423110"/>
+          <a:ext cx="2500903" cy="1181262"/>
         </a:xfrm>
         <a:prstGeom prst="rect">
           <a:avLst/>
@@ -1908,18 +1741,23 @@
             </a:spcAft>
           </a:pPr>
           <a:r>
-            <a:rPr lang="de-DE" sz="1400" b="0" i="0" kern="1200">
+            <a:rPr lang="de-DE" sz="1400" b="0" i="0" kern="1200" dirty="0" smtClean="0">
               <a:latin typeface="Century Gothic"/>
               <a:ea typeface="+mn-ea"/>
               <a:cs typeface="+mn-cs"/>
             </a:rPr>
-            <a:t>Planen</a:t>
+            <a:t>Kontextabgrenzung</a:t>
           </a:r>
+          <a:endParaRPr lang="de-DE" sz="1400" b="0" i="0" kern="1200" dirty="0">
+            <a:latin typeface="Century Gothic"/>
+            <a:ea typeface="+mn-ea"/>
+            <a:cs typeface="+mn-cs"/>
+          </a:endParaRPr>
         </a:p>
       </dsp:txBody>
       <dsp:txXfrm>
-        <a:off x="2037488" y="14358"/>
-        <a:ext cx="1502779" cy="1086493"/>
+        <a:off x="408676" y="423110"/>
+        <a:ext cx="2500903" cy="1181262"/>
       </dsp:txXfrm>
     </dsp:sp>
     <dsp:sp modelId="{7ACA9D6E-B4F2-44F7-ADFA-C71D9AD1611D}">
@@ -1929,32 +1767,14 @@
       </dsp:nvSpPr>
       <dsp:spPr>
         <a:xfrm>
-          <a:off x="2796567" y="1045330"/>
-          <a:ext cx="1122624" cy="1122390"/>
+          <a:off x="2617052" y="1791995"/>
+          <a:ext cx="1220168" cy="1220509"/>
         </a:xfrm>
         <a:prstGeom prst="ellipse">
           <a:avLst/>
         </a:prstGeom>
-        <a:blipFill dpi="0" rotWithShape="1">
-          <a:blip xmlns:r="http://schemas.openxmlformats.org/officeDocument/2006/relationships" r:embed="rId2" cstate="print">
-            <a:duotone>
-              <a:schemeClr val="dk2">
-                <a:hueOff val="0"/>
-                <a:satOff val="0"/>
-                <a:lumOff val="0"/>
-                <a:alphaOff val="0"/>
-                <a:shade val="20000"/>
-                <a:satMod val="200000"/>
-              </a:schemeClr>
-              <a:schemeClr val="dk2">
-                <a:hueOff val="0"/>
-                <a:satOff val="0"/>
-                <a:lumOff val="0"/>
-                <a:alphaOff val="0"/>
-                <a:tint val="12000"/>
-                <a:satMod val="190000"/>
-              </a:schemeClr>
-            </a:duotone>
+        <a:blipFill>
+          <a:blip xmlns:r="http://schemas.openxmlformats.org/officeDocument/2006/relationships" r:embed="rId3">
             <a:extLst>
               <a:ext uri="{28A0092B-C50C-407E-A947-70E740481C1C}">
                 <a14:useLocalDpi xmlns:a14="http://schemas.microsoft.com/office/drawing/2010/main" val="0"/>
@@ -1963,7 +1783,7 @@
           </a:blip>
           <a:srcRect/>
           <a:stretch>
-            <a:fillRect/>
+            <a:fillRect l="-40000" r="-40000"/>
           </a:stretch>
         </a:blipFill>
         <a:ln>
@@ -1997,8 +1817,8 @@
       </dsp:nvSpPr>
       <dsp:spPr>
         <a:xfrm>
-          <a:off x="1211359" y="1064954"/>
-          <a:ext cx="1502779" cy="1086493"/>
+          <a:off x="884454" y="1809226"/>
+          <a:ext cx="1633243" cy="1181262"/>
         </a:xfrm>
         <a:prstGeom prst="rect">
           <a:avLst/>
@@ -2039,18 +1859,23 @@
             </a:spcAft>
           </a:pPr>
           <a:r>
-            <a:rPr lang="de-DE" sz="1400" b="0" i="0" kern="1200">
+            <a:rPr lang="de-DE" sz="1400" b="0" i="0" kern="1200" dirty="0" smtClean="0">
               <a:latin typeface="Century Gothic"/>
               <a:ea typeface="+mn-ea"/>
               <a:cs typeface="+mn-cs"/>
             </a:rPr>
-            <a:t>Entwickeln</a:t>
+            <a:t>Bausteinsicht</a:t>
           </a:r>
+          <a:endParaRPr lang="de-DE" sz="1400" b="0" i="0" kern="1200" dirty="0">
+            <a:latin typeface="Century Gothic"/>
+            <a:ea typeface="+mn-ea"/>
+            <a:cs typeface="+mn-cs"/>
+          </a:endParaRPr>
         </a:p>
       </dsp:txBody>
       <dsp:txXfrm>
-        <a:off x="1211359" y="1064954"/>
-        <a:ext cx="1502779" cy="1086493"/>
+        <a:off x="884454" y="1809226"/>
+        <a:ext cx="1633243" cy="1181262"/>
       </dsp:txXfrm>
     </dsp:sp>
     <dsp:sp modelId="{07F3DE25-1642-45C2-B4F6-1F381AF4B3C9}">
@@ -2060,32 +1885,14 @@
       </dsp:nvSpPr>
       <dsp:spPr>
         <a:xfrm>
-          <a:off x="2800873" y="2582215"/>
-          <a:ext cx="1122624" cy="1122390"/>
+          <a:off x="3088651" y="3200128"/>
+          <a:ext cx="1220168" cy="1220509"/>
         </a:xfrm>
         <a:prstGeom prst="ellipse">
           <a:avLst/>
         </a:prstGeom>
-        <a:blipFill dpi="0" rotWithShape="1">
-          <a:blip xmlns:r="http://schemas.openxmlformats.org/officeDocument/2006/relationships" r:embed="rId3" cstate="print">
-            <a:duotone>
-              <a:schemeClr val="dk2">
-                <a:hueOff val="0"/>
-                <a:satOff val="0"/>
-                <a:lumOff val="0"/>
-                <a:alphaOff val="0"/>
-                <a:shade val="20000"/>
-                <a:satMod val="200000"/>
-              </a:schemeClr>
-              <a:schemeClr val="dk2">
-                <a:hueOff val="0"/>
-                <a:satOff val="0"/>
-                <a:lumOff val="0"/>
-                <a:alphaOff val="0"/>
-                <a:tint val="12000"/>
-                <a:satMod val="190000"/>
-              </a:schemeClr>
-            </a:duotone>
+        <a:blipFill>
+          <a:blip xmlns:r="http://schemas.openxmlformats.org/officeDocument/2006/relationships" r:embed="rId4" cstate="print">
             <a:extLst>
               <a:ext uri="{28A0092B-C50C-407E-A947-70E740481C1C}">
                 <a14:useLocalDpi xmlns:a14="http://schemas.microsoft.com/office/drawing/2010/main" val="0"/>
@@ -2094,7 +1901,7 @@
           </a:blip>
           <a:srcRect/>
           <a:stretch>
-            <a:fillRect/>
+            <a:fillRect t="-1000" b="-1000"/>
           </a:stretch>
         </a:blipFill>
         <a:ln>
@@ -2128,8 +1935,8 @@
       </dsp:nvSpPr>
       <dsp:spPr>
         <a:xfrm>
-          <a:off x="1211359" y="2600403"/>
-          <a:ext cx="1502779" cy="1086493"/>
+          <a:off x="1362858" y="3225017"/>
+          <a:ext cx="1633243" cy="1181262"/>
         </a:xfrm>
         <a:prstGeom prst="rect">
           <a:avLst/>
@@ -2170,149 +1977,23 @@
             </a:spcAft>
           </a:pPr>
           <a:r>
-            <a:rPr lang="de-DE" sz="1400" b="0" i="0" kern="1200">
+            <a:rPr lang="de-DE" sz="1400" b="0" i="0" kern="1200" dirty="0" smtClean="0">
               <a:latin typeface="Century Gothic"/>
               <a:ea typeface="+mn-ea"/>
               <a:cs typeface="+mn-cs"/>
             </a:rPr>
-            <a:t>Testen</a:t>
+            <a:t>Laufzeitsicht</a:t>
           </a:r>
+          <a:endParaRPr lang="de-DE" sz="1400" b="0" i="0" kern="1200" dirty="0">
+            <a:latin typeface="Century Gothic"/>
+            <a:ea typeface="+mn-ea"/>
+            <a:cs typeface="+mn-cs"/>
+          </a:endParaRPr>
         </a:p>
       </dsp:txBody>
       <dsp:txXfrm>
-        <a:off x="1211359" y="2600403"/>
-        <a:ext cx="1502779" cy="1086493"/>
-      </dsp:txXfrm>
-    </dsp:sp>
-    <dsp:sp modelId="{37E17C6F-ED68-448D-88C1-BFA2E9B6DD18}">
-      <dsp:nvSpPr>
-        <dsp:cNvPr id="0" name=""/>
-        <dsp:cNvSpPr/>
-      </dsp:nvSpPr>
-      <dsp:spPr>
-        <a:xfrm>
-          <a:off x="3625771" y="3663922"/>
-          <a:ext cx="1122624" cy="1122390"/>
-        </a:xfrm>
-        <a:prstGeom prst="ellipse">
-          <a:avLst/>
-        </a:prstGeom>
-        <a:blipFill dpi="0" rotWithShape="1">
-          <a:blip xmlns:r="http://schemas.openxmlformats.org/officeDocument/2006/relationships" r:embed="rId4" cstate="print">
-            <a:duotone>
-              <a:schemeClr val="dk2">
-                <a:hueOff val="0"/>
-                <a:satOff val="0"/>
-                <a:lumOff val="0"/>
-                <a:alphaOff val="0"/>
-                <a:shade val="20000"/>
-                <a:satMod val="200000"/>
-              </a:schemeClr>
-              <a:schemeClr val="dk2">
-                <a:hueOff val="0"/>
-                <a:satOff val="0"/>
-                <a:lumOff val="0"/>
-                <a:alphaOff val="0"/>
-                <a:tint val="12000"/>
-                <a:satMod val="190000"/>
-              </a:schemeClr>
-            </a:duotone>
-            <a:extLst>
-              <a:ext uri="{28A0092B-C50C-407E-A947-70E740481C1C}">
-                <a14:useLocalDpi xmlns:a14="http://schemas.microsoft.com/office/drawing/2010/main" val="0"/>
-              </a:ext>
-            </a:extLst>
-          </a:blip>
-          <a:srcRect/>
-          <a:stretch>
-            <a:fillRect/>
-          </a:stretch>
-        </a:blipFill>
-        <a:ln>
-          <a:noFill/>
-        </a:ln>
-        <a:effectLst>
-          <a:outerShdw blurRad="38100" dist="25400" dir="5400000" rotWithShape="0">
-            <a:srgbClr val="000000">
-              <a:alpha val="45000"/>
-            </a:srgbClr>
-          </a:outerShdw>
-        </a:effectLst>
-      </dsp:spPr>
-      <dsp:style>
-        <a:lnRef idx="0">
-          <a:scrgbClr r="0" g="0" b="0"/>
-        </a:lnRef>
-        <a:fillRef idx="1">
-          <a:scrgbClr r="0" g="0" b="0"/>
-        </a:fillRef>
-        <a:effectRef idx="2">
-          <a:scrgbClr r="0" g="0" b="0"/>
-        </a:effectRef>
-        <a:fontRef idx="minor"/>
-      </dsp:style>
-    </dsp:sp>
-    <dsp:sp modelId="{9658C117-7785-4D2C-B987-9EA97BF9F6B2}">
-      <dsp:nvSpPr>
-        <dsp:cNvPr id="0" name=""/>
-        <dsp:cNvSpPr/>
-      </dsp:nvSpPr>
-      <dsp:spPr>
-        <a:xfrm>
-          <a:off x="2037488" y="3686896"/>
-          <a:ext cx="1502779" cy="1086493"/>
-        </a:xfrm>
-        <a:prstGeom prst="rect">
-          <a:avLst/>
-        </a:prstGeom>
-        <a:noFill/>
-        <a:ln>
-          <a:noFill/>
-        </a:ln>
-        <a:effectLst/>
-      </dsp:spPr>
-      <dsp:style>
-        <a:lnRef idx="0">
-          <a:scrgbClr r="0" g="0" b="0"/>
-        </a:lnRef>
-        <a:fillRef idx="0">
-          <a:scrgbClr r="0" g="0" b="0"/>
-        </a:fillRef>
-        <a:effectRef idx="0">
-          <a:scrgbClr r="0" g="0" b="0"/>
-        </a:effectRef>
-        <a:fontRef idx="minor"/>
-      </dsp:style>
-      <dsp:txBody>
-        <a:bodyPr spcFirstLastPara="0" vert="horz" wrap="square" lIns="17780" tIns="17780" rIns="17780" bIns="17780" numCol="1" spcCol="1270" anchor="ctr" anchorCtr="0">
-          <a:noAutofit/>
-        </a:bodyPr>
-        <a:lstStyle/>
-        <a:p>
-          <a:pPr lvl="0" algn="r" defTabSz="622300">
-            <a:lnSpc>
-              <a:spcPct val="90000"/>
-            </a:lnSpc>
-            <a:spcBef>
-              <a:spcPct val="0"/>
-            </a:spcBef>
-            <a:spcAft>
-              <a:spcPct val="10000"/>
-            </a:spcAft>
-          </a:pPr>
-          <a:r>
-            <a:rPr lang="de-DE" sz="1400" b="0" i="0" kern="1200" dirty="0">
-              <a:latin typeface="Century Gothic"/>
-              <a:ea typeface="+mn-ea"/>
-              <a:cs typeface="+mn-cs"/>
-            </a:rPr>
-            <a:t>Analysieren</a:t>
-          </a:r>
-        </a:p>
-      </dsp:txBody>
-      <dsp:txXfrm>
-        <a:off x="2037488" y="3686896"/>
-        <a:ext cx="1502779" cy="1086493"/>
+        <a:off x="1362858" y="3225017"/>
+        <a:ext cx="1633243" cy="1181262"/>
       </dsp:txXfrm>
     </dsp:sp>
   </dsp:spTree>
@@ -4221,7 +3902,7 @@
           <a:p>
             <a:fld id="{52BBEB64-35AE-4293-AF4C-38F790147BED}" type="datetimeFigureOut">
               <a:rPr lang="de-DE"/>
-              <a:t>16.05.2014</a:t>
+              <a:t>19.05.2014</a:t>
             </a:fld>
             <a:endParaRPr/>
           </a:p>
@@ -4386,7 +4067,7 @@
           <a:p>
             <a:fld id="{BC2AE60B-075F-4DD5-8053-C8426E2D0DAD}" type="datetimeFigureOut">
               <a:rPr lang="de-DE"/>
-              <a:t>16.05.2014</a:t>
+              <a:t>19.05.2014</a:t>
             </a:fld>
             <a:endParaRPr/>
           </a:p>
@@ -4795,7 +4476,7 @@
           <a:p>
             <a:fld id="{A8224893-DBDA-4BFA-9CE1-4BFE7CD0F8CF}" type="datetime1">
               <a:rPr lang="de-DE" noProof="0" smtClean="0"/>
-              <a:t>16.05.2014</a:t>
+              <a:t>19.05.2014</a:t>
             </a:fld>
             <a:endParaRPr lang="de-DE" noProof="0" dirty="0"/>
           </a:p>
@@ -4972,7 +4653,7 @@
           <a:p>
             <a:fld id="{5F4E5243-F52A-4D37-9694-EB26C6C31910}" type="datetime1">
               <a:rPr lang="de-DE" noProof="0" smtClean="0"/>
-              <a:t>16.05.2014</a:t>
+              <a:t>19.05.2014</a:t>
             </a:fld>
             <a:endParaRPr lang="de-DE" noProof="0" dirty="0"/>
           </a:p>
@@ -5152,7 +4833,7 @@
           <a:p>
             <a:fld id="{3A77B6E1-634A-48DC-9E8B-D894023267EF}" type="datetime1">
               <a:rPr lang="de-DE" noProof="0" smtClean="0"/>
-              <a:t>16.05.2014</a:t>
+              <a:t>19.05.2014</a:t>
             </a:fld>
             <a:endParaRPr lang="de-DE" noProof="0" dirty="0"/>
           </a:p>
@@ -5399,7 +5080,7 @@
           <a:p>
             <a:fld id="{A8224893-DBDA-4BFA-9CE1-4BFE7CD0F8CF}" type="datetime1">
               <a:rPr lang="de-DE" noProof="0" smtClean="0"/>
-              <a:t>16.05.2014</a:t>
+              <a:t>19.05.2014</a:t>
             </a:fld>
             <a:endParaRPr lang="de-DE" noProof="0" dirty="0"/>
           </a:p>
@@ -5569,7 +5250,7 @@
           <a:p>
             <a:fld id="{7B2D3E9E-A95C-48F2-B4BF-A71542E0BE9A}" type="datetime1">
               <a:rPr lang="de-DE" noProof="0" smtClean="0"/>
-              <a:t>16.05.2014</a:t>
+              <a:t>19.05.2014</a:t>
             </a:fld>
             <a:endParaRPr lang="de-DE" noProof="0" dirty="0"/>
           </a:p>
@@ -5816,7 +5497,7 @@
           <a:p>
             <a:fld id="{5586B75A-687E-405C-8A0B-8D00578BA2C3}" type="datetime1">
               <a:rPr lang="de-DE" noProof="0" smtClean="0"/>
-              <a:t>16.05.2014</a:t>
+              <a:t>19.05.2014</a:t>
             </a:fld>
             <a:endParaRPr lang="de-DE" noProof="0" dirty="0"/>
           </a:p>
@@ -6109,7 +5790,7 @@
           <a:p>
             <a:fld id="{F12952B5-7A2F-4CC8-B7CE-9234E21C2837}" type="datetime1">
               <a:rPr lang="de-DE" noProof="0" smtClean="0"/>
-              <a:t>16.05.2014</a:t>
+              <a:t>19.05.2014</a:t>
             </a:fld>
             <a:endParaRPr lang="de-DE" noProof="0" dirty="0"/>
           </a:p>
@@ -6553,7 +6234,7 @@
           <a:p>
             <a:fld id="{CE1DA07A-9201-4B4B-BAF2-015AFA30F520}" type="datetime1">
               <a:rPr lang="de-DE" noProof="0" smtClean="0"/>
-              <a:t>16.05.2014</a:t>
+              <a:t>19.05.2014</a:t>
             </a:fld>
             <a:endParaRPr lang="de-DE" noProof="0" dirty="0"/>
           </a:p>
@@ -6671,7 +6352,7 @@
           <a:p>
             <a:fld id="{73D7E00A-486F-4252-8B1D-E32645521F49}" type="datetime1">
               <a:rPr lang="de-DE" noProof="0" smtClean="0"/>
-              <a:t>16.05.2014</a:t>
+              <a:t>19.05.2014</a:t>
             </a:fld>
             <a:endParaRPr lang="de-DE" noProof="0" dirty="0"/>
           </a:p>
@@ -6766,7 +6447,7 @@
           <a:p>
             <a:fld id="{8DDF5F92-E675-4B36-9A60-69A962A68675}" type="datetime1">
               <a:rPr lang="de-DE" noProof="0" smtClean="0"/>
-              <a:t>16.05.2014</a:t>
+              <a:t>19.05.2014</a:t>
             </a:fld>
             <a:endParaRPr lang="de-DE" noProof="0" dirty="0"/>
           </a:p>
@@ -7045,7 +6726,7 @@
           <a:p>
             <a:fld id="{AF6E2C9B-5FA2-460D-9BE7-B0812FC2A6FF}" type="datetime1">
               <a:rPr lang="de-DE" noProof="0" smtClean="0"/>
-              <a:t>16.05.2014</a:t>
+              <a:t>19.05.2014</a:t>
             </a:fld>
             <a:endParaRPr lang="de-DE" noProof="0" dirty="0"/>
           </a:p>
@@ -7215,7 +6896,7 @@
           <a:p>
             <a:fld id="{7B2D3E9E-A95C-48F2-B4BF-A71542E0BE9A}" type="datetime1">
               <a:rPr lang="de-DE" noProof="0" smtClean="0"/>
-              <a:t>16.05.2014</a:t>
+              <a:t>19.05.2014</a:t>
             </a:fld>
             <a:endParaRPr lang="de-DE" noProof="0" dirty="0"/>
           </a:p>
@@ -7497,7 +7178,7 @@
           <a:p>
             <a:fld id="{1D374940-A916-4C8B-9648-02A2D3898F9E}" type="datetime1">
               <a:rPr lang="de-DE" noProof="0" smtClean="0"/>
-              <a:t>16.05.2014</a:t>
+              <a:t>19.05.2014</a:t>
             </a:fld>
             <a:endParaRPr lang="de-DE" noProof="0" dirty="0"/>
           </a:p>
@@ -7772,7 +7453,7 @@
           <a:p>
             <a:fld id="{5586B75A-687E-405C-8A0B-8D00578BA2C3}" type="datetime1">
               <a:rPr lang="de-DE" noProof="0" smtClean="0"/>
-              <a:t>16.05.2014</a:t>
+              <a:t>19.05.2014</a:t>
             </a:fld>
             <a:endParaRPr lang="de-DE" noProof="0" dirty="0"/>
           </a:p>
@@ -7967,7 +7648,7 @@
           <a:p>
             <a:fld id="{5586B75A-687E-405C-8A0B-8D00578BA2C3}" type="datetime1">
               <a:rPr lang="de-DE" noProof="0" smtClean="0"/>
-              <a:t>16.05.2014</a:t>
+              <a:t>19.05.2014</a:t>
             </a:fld>
             <a:endParaRPr lang="de-DE" noProof="0" dirty="0"/>
           </a:p>
@@ -8241,7 +7922,7 @@
           <a:p>
             <a:fld id="{5586B75A-687E-405C-8A0B-8D00578BA2C3}" type="datetime1">
               <a:rPr lang="de-DE" noProof="0" smtClean="0"/>
-              <a:t>16.05.2014</a:t>
+              <a:t>19.05.2014</a:t>
             </a:fld>
             <a:endParaRPr lang="de-DE" noProof="0" dirty="0"/>
           </a:p>
@@ -8583,7 +8264,7 @@
           <a:p>
             <a:fld id="{5586B75A-687E-405C-8A0B-8D00578BA2C3}" type="datetime1">
               <a:rPr lang="de-DE" noProof="0" smtClean="0"/>
-              <a:t>16.05.2014</a:t>
+              <a:t>19.05.2014</a:t>
             </a:fld>
             <a:endParaRPr lang="de-DE" noProof="0" dirty="0"/>
           </a:p>
@@ -9207,7 +8888,7 @@
           <a:p>
             <a:fld id="{5586B75A-687E-405C-8A0B-8D00578BA2C3}" type="datetime1">
               <a:rPr lang="de-DE" noProof="0" smtClean="0"/>
-              <a:t>16.05.2014</a:t>
+              <a:t>19.05.2014</a:t>
             </a:fld>
             <a:endParaRPr lang="de-DE" noProof="0" dirty="0"/>
           </a:p>
@@ -10068,7 +9749,7 @@
           <a:p>
             <a:fld id="{5586B75A-687E-405C-8A0B-8D00578BA2C3}" type="datetime1">
               <a:rPr lang="de-DE" noProof="0" smtClean="0"/>
-              <a:t>16.05.2014</a:t>
+              <a:t>19.05.2014</a:t>
             </a:fld>
             <a:endParaRPr lang="de-DE" noProof="0" dirty="0"/>
           </a:p>
@@ -10239,7 +9920,7 @@
           <a:p>
             <a:fld id="{5F4E5243-F52A-4D37-9694-EB26C6C31910}" type="datetime1">
               <a:rPr lang="de-DE" noProof="0" smtClean="0"/>
-              <a:t>16.05.2014</a:t>
+              <a:t>19.05.2014</a:t>
             </a:fld>
             <a:endParaRPr lang="de-DE" noProof="0" dirty="0"/>
           </a:p>
@@ -10419,7 +10100,7 @@
           <a:p>
             <a:fld id="{3A77B6E1-634A-48DC-9E8B-D894023267EF}" type="datetime1">
               <a:rPr lang="de-DE" noProof="0" smtClean="0"/>
-              <a:t>16.05.2014</a:t>
+              <a:t>19.05.2014</a:t>
             </a:fld>
             <a:endParaRPr lang="de-DE" noProof="0" dirty="0"/>
           </a:p>
@@ -10670,7 +10351,7 @@
           <a:p>
             <a:fld id="{A50F84E2-2D7A-43CF-AC90-352A289A783A}" type="datetime1">
               <a:rPr lang="de-DE" noProof="0" smtClean="0"/>
-              <a:t>16.05.2014</a:t>
+              <a:t>19.05.2014</a:t>
             </a:fld>
             <a:endParaRPr lang="de-DE" noProof="0" dirty="0"/>
           </a:p>
@@ -10969,7 +10650,7 @@
           <a:p>
             <a:fld id="{F12952B5-7A2F-4CC8-B7CE-9234E21C2837}" type="datetime1">
               <a:rPr lang="de-DE" noProof="0" smtClean="0"/>
-              <a:t>16.05.2014</a:t>
+              <a:t>19.05.2014</a:t>
             </a:fld>
             <a:endParaRPr lang="de-DE" noProof="0" dirty="0"/>
           </a:p>
@@ -11377,7 +11058,7 @@
           <a:p>
             <a:fld id="{CE1DA07A-9201-4B4B-BAF2-015AFA30F520}" type="datetime1">
               <a:rPr lang="de-DE" noProof="0" smtClean="0"/>
-              <a:t>16.05.2014</a:t>
+              <a:t>19.05.2014</a:t>
             </a:fld>
             <a:endParaRPr lang="de-DE" noProof="0" dirty="0"/>
           </a:p>
@@ -11502,7 +11183,7 @@
           <a:p>
             <a:fld id="{73D7E00A-486F-4252-8B1D-E32645521F49}" type="datetime1">
               <a:rPr lang="de-DE" noProof="0" smtClean="0"/>
-              <a:t>16.05.2014</a:t>
+              <a:t>19.05.2014</a:t>
             </a:fld>
             <a:endParaRPr lang="de-DE" noProof="0" dirty="0"/>
           </a:p>
@@ -11627,7 +11308,7 @@
           <a:p>
             <a:fld id="{8DDF5F92-E675-4B36-9A60-69A962A68675}" type="datetime1">
               <a:rPr lang="de-DE" noProof="0" smtClean="0"/>
-              <a:t>16.05.2014</a:t>
+              <a:t>19.05.2014</a:t>
             </a:fld>
             <a:endParaRPr lang="de-DE" noProof="0" dirty="0"/>
           </a:p>
@@ -11913,7 +11594,7 @@
           <a:p>
             <a:fld id="{AF6E2C9B-5FA2-460D-9BE7-B0812FC2A6FF}" type="datetime1">
               <a:rPr lang="de-DE" noProof="0" smtClean="0"/>
-              <a:t>16.05.2014</a:t>
+              <a:t>19.05.2014</a:t>
             </a:fld>
             <a:endParaRPr lang="de-DE" noProof="0" dirty="0"/>
           </a:p>
@@ -12186,7 +11867,7 @@
           <a:p>
             <a:fld id="{1D374940-A916-4C8B-9648-02A2D3898F9E}" type="datetime1">
               <a:rPr lang="de-DE" noProof="0" smtClean="0"/>
-              <a:t>16.05.2014</a:t>
+              <a:t>19.05.2014</a:t>
             </a:fld>
             <a:endParaRPr lang="de-DE" noProof="0" dirty="0"/>
           </a:p>
@@ -12407,7 +12088,7 @@
           <a:p>
             <a:fld id="{5586B75A-687E-405C-8A0B-8D00578BA2C3}" type="datetime1">
               <a:rPr lang="de-DE" noProof="0" smtClean="0"/>
-              <a:t>16.05.2014</a:t>
+              <a:t>19.05.2014</a:t>
             </a:fld>
             <a:endParaRPr lang="de-DE" noProof="0" dirty="0"/>
           </a:p>
@@ -13160,7 +12841,7 @@
           <a:p>
             <a:fld id="{5586B75A-687E-405C-8A0B-8D00578BA2C3}" type="datetime1">
               <a:rPr lang="de-DE" noProof="0" smtClean="0"/>
-              <a:t>16.05.2014</a:t>
+              <a:t>19.05.2014</a:t>
             </a:fld>
             <a:endParaRPr lang="de-DE" noProof="0" dirty="0"/>
           </a:p>
@@ -13744,7 +13425,7 @@
           <p:nvPr>
             <p:extLst>
               <p:ext uri="{D42A27DB-BD31-4B8C-83A1-F6EECF244321}">
-                <p14:modId xmlns:p14="http://schemas.microsoft.com/office/powerpoint/2010/main" val="2420602791"/>
+                <p14:modId xmlns:p14="http://schemas.microsoft.com/office/powerpoint/2010/main" val="976153767"/>
               </p:ext>
             </p:extLst>
           </p:nvPr>
@@ -13769,6 +13450,822 @@
   <p:clrMapOvr>
     <a:masterClrMapping/>
   </p:clrMapOvr>
+  <mc:AlternateContent xmlns:mc="http://schemas.openxmlformats.org/markup-compatibility/2006">
+    <mc:Choice xmlns:p14="http://schemas.microsoft.com/office/powerpoint/2010/main" Requires="p14">
+      <p:transition p14:dur="0"/>
+    </mc:Choice>
+    <mc:Fallback>
+      <p:transition/>
+    </mc:Fallback>
+  </mc:AlternateContent>
+  <p:timing>
+    <p:tnLst>
+      <p:par>
+        <p:cTn id="1" dur="indefinite" restart="never" nodeType="tmRoot"/>
+      </p:par>
+    </p:tnLst>
+  </p:timing>
+</p:sld>
+</file>
+
+<file path=ppt/slides/slide2.xml><?xml version="1.0" encoding="utf-8"?>
+<p:sld xmlns:a="http://schemas.openxmlformats.org/drawingml/2006/main" xmlns:r="http://schemas.openxmlformats.org/officeDocument/2006/relationships" xmlns:p="http://schemas.openxmlformats.org/presentationml/2006/main">
+  <p:cSld>
+    <p:spTree>
+      <p:nvGrpSpPr>
+        <p:cNvPr id="1" name=""/>
+        <p:cNvGrpSpPr/>
+        <p:nvPr/>
+      </p:nvGrpSpPr>
+      <p:grpSpPr>
+        <a:xfrm>
+          <a:off x="0" y="0"/>
+          <a:ext cx="0" cy="0"/>
+          <a:chOff x="0" y="0"/>
+          <a:chExt cx="0" cy="0"/>
+        </a:xfrm>
+      </p:grpSpPr>
+      <p:sp>
+        <p:nvSpPr>
+          <p:cNvPr id="2" name="Titel 1"/>
+          <p:cNvSpPr>
+            <a:spLocks noGrp="1"/>
+          </p:cNvSpPr>
+          <p:nvPr>
+            <p:ph type="title"/>
+          </p:nvPr>
+        </p:nvSpPr>
+        <p:spPr/>
+        <p:txBody>
+          <a:bodyPr/>
+          <a:lstStyle/>
+          <a:p>
+            <a:r>
+              <a:rPr lang="de-AT" dirty="0" smtClean="0"/>
+              <a:t>Kontextabgrenzung</a:t>
+            </a:r>
+            <a:endParaRPr lang="en-US" dirty="0"/>
+          </a:p>
+        </p:txBody>
+      </p:sp>
+      <p:sp>
+        <p:nvSpPr>
+          <p:cNvPr id="3" name="Ellipse 2"/>
+          <p:cNvSpPr/>
+          <p:nvPr/>
+        </p:nvSpPr>
+        <p:spPr>
+          <a:xfrm>
+            <a:off x="11292172" y="5980090"/>
+            <a:ext cx="737763" cy="737969"/>
+          </a:xfrm>
+          <a:prstGeom prst="ellipse">
+            <a:avLst/>
+          </a:prstGeom>
+          <a:blipFill>
+            <a:blip r:embed="rId2">
+              <a:extLst>
+                <a:ext uri="{BEBA8EAE-BF5A-486C-A8C5-ECC9F3942E4B}">
+                  <a14:imgProps xmlns:a14="http://schemas.microsoft.com/office/drawing/2010/main">
+                    <a14:imgLayer r:embed="rId3">
+                      <a14:imgEffect>
+                        <a14:saturation sat="400000"/>
+                      </a14:imgEffect>
+                    </a14:imgLayer>
+                  </a14:imgProps>
+                </a:ext>
+                <a:ext uri="{28A0092B-C50C-407E-A947-70E740481C1C}">
+                  <a14:useLocalDpi xmlns:a14="http://schemas.microsoft.com/office/drawing/2010/main" val="0"/>
+                </a:ext>
+              </a:extLst>
+            </a:blip>
+            <a:stretch>
+              <a:fillRect l="-189000" r="-189000"/>
+            </a:stretch>
+          </a:blipFill>
+          <a:effectLst>
+            <a:glow>
+              <a:schemeClr val="accent1"/>
+            </a:glow>
+          </a:effectLst>
+        </p:spPr>
+        <p:style>
+          <a:lnRef idx="0">
+            <a:schemeClr val="dk2">
+              <a:shade val="80000"/>
+              <a:hueOff val="0"/>
+              <a:satOff val="0"/>
+              <a:lumOff val="0"/>
+              <a:alphaOff val="0"/>
+            </a:schemeClr>
+          </a:lnRef>
+          <a:fillRef idx="1">
+            <a:scrgbClr r="0" g="0" b="0"/>
+          </a:fillRef>
+          <a:effectRef idx="2">
+            <a:scrgbClr r="0" g="0" b="0"/>
+          </a:effectRef>
+          <a:fontRef idx="minor">
+            <a:schemeClr val="lt1">
+              <a:hueOff val="0"/>
+              <a:satOff val="0"/>
+              <a:lumOff val="0"/>
+              <a:alphaOff val="0"/>
+            </a:schemeClr>
+          </a:fontRef>
+        </p:style>
+      </p:sp>
+      <p:grpSp>
+        <p:nvGrpSpPr>
+          <p:cNvPr id="4" name="Gruppieren 3"/>
+          <p:cNvGrpSpPr/>
+          <p:nvPr/>
+        </p:nvGrpSpPr>
+        <p:grpSpPr>
+          <a:xfrm>
+            <a:off x="8202221" y="5536797"/>
+            <a:ext cx="2923652" cy="1181262"/>
+            <a:chOff x="481104" y="442733"/>
+            <a:chExt cx="2923652" cy="1181262"/>
+          </a:xfrm>
+        </p:grpSpPr>
+        <p:sp>
+          <p:nvSpPr>
+            <p:cNvPr id="5" name="Rechteck 4"/>
+            <p:cNvSpPr/>
+            <p:nvPr/>
+          </p:nvSpPr>
+          <p:spPr>
+            <a:xfrm>
+              <a:off x="481104" y="442733"/>
+              <a:ext cx="2500903" cy="1181262"/>
+            </a:xfrm>
+            <a:prstGeom prst="rect">
+              <a:avLst/>
+            </a:prstGeom>
+          </p:spPr>
+          <p:style>
+            <a:lnRef idx="0">
+              <a:schemeClr val="dk2">
+                <a:alpha val="0"/>
+                <a:hueOff val="0"/>
+                <a:satOff val="0"/>
+                <a:lumOff val="0"/>
+                <a:alphaOff val="0"/>
+              </a:schemeClr>
+            </a:lnRef>
+            <a:fillRef idx="0">
+              <a:schemeClr val="lt1">
+                <a:alpha val="0"/>
+                <a:hueOff val="0"/>
+                <a:satOff val="0"/>
+                <a:lumOff val="0"/>
+                <a:alphaOff val="0"/>
+              </a:schemeClr>
+            </a:fillRef>
+            <a:effectRef idx="0">
+              <a:schemeClr val="lt1">
+                <a:alpha val="0"/>
+                <a:hueOff val="0"/>
+                <a:satOff val="0"/>
+                <a:lumOff val="0"/>
+                <a:alphaOff val="0"/>
+              </a:schemeClr>
+            </a:effectRef>
+            <a:fontRef idx="minor">
+              <a:schemeClr val="tx1">
+                <a:hueOff val="0"/>
+                <a:satOff val="0"/>
+                <a:lumOff val="0"/>
+                <a:alphaOff val="0"/>
+              </a:schemeClr>
+            </a:fontRef>
+          </p:style>
+        </p:sp>
+        <p:sp>
+          <p:nvSpPr>
+            <p:cNvPr id="6" name="Rechteck 5"/>
+            <p:cNvSpPr/>
+            <p:nvPr/>
+          </p:nvSpPr>
+          <p:spPr>
+            <a:xfrm>
+              <a:off x="1557452" y="895837"/>
+              <a:ext cx="1847304" cy="718346"/>
+            </a:xfrm>
+            <a:prstGeom prst="rect">
+              <a:avLst/>
+            </a:prstGeom>
+          </p:spPr>
+          <p:style>
+            <a:lnRef idx="0">
+              <a:scrgbClr r="0" g="0" b="0"/>
+            </a:lnRef>
+            <a:fillRef idx="0">
+              <a:scrgbClr r="0" g="0" b="0"/>
+            </a:fillRef>
+            <a:effectRef idx="0">
+              <a:scrgbClr r="0" g="0" b="0"/>
+            </a:effectRef>
+            <a:fontRef idx="minor">
+              <a:schemeClr val="tx1">
+                <a:hueOff val="0"/>
+                <a:satOff val="0"/>
+                <a:lumOff val="0"/>
+                <a:alphaOff val="0"/>
+              </a:schemeClr>
+            </a:fontRef>
+          </p:style>
+          <p:txBody>
+            <a:bodyPr spcFirstLastPara="0" vert="horz" wrap="square" lIns="17780" tIns="17780" rIns="17780" bIns="17780" numCol="1" spcCol="1270" anchor="ctr" anchorCtr="0">
+              <a:noAutofit/>
+            </a:bodyPr>
+            <a:lstStyle/>
+            <a:p>
+              <a:pPr lvl="0" algn="r" defTabSz="622300">
+                <a:lnSpc>
+                  <a:spcPct val="90000"/>
+                </a:lnSpc>
+                <a:spcBef>
+                  <a:spcPct val="0"/>
+                </a:spcBef>
+                <a:spcAft>
+                  <a:spcPct val="10000"/>
+                </a:spcAft>
+              </a:pPr>
+              <a:r>
+                <a:rPr lang="de-DE" sz="1400" b="0" i="0" kern="1200" dirty="0" smtClean="0">
+                  <a:latin typeface="Century Gothic"/>
+                  <a:ea typeface="+mn-ea"/>
+                  <a:cs typeface="+mn-cs"/>
+                </a:rPr>
+                <a:t>Kontextabgrenzung</a:t>
+              </a:r>
+              <a:endParaRPr lang="de-DE" sz="1400" b="0" i="0" kern="1200" dirty="0">
+                <a:latin typeface="Century Gothic"/>
+                <a:ea typeface="+mn-ea"/>
+                <a:cs typeface="+mn-cs"/>
+              </a:endParaRPr>
+            </a:p>
+          </p:txBody>
+        </p:sp>
+      </p:grpSp>
+    </p:spTree>
+    <p:extLst>
+      <p:ext uri="{BB962C8B-B14F-4D97-AF65-F5344CB8AC3E}">
+        <p14:creationId xmlns:p14="http://schemas.microsoft.com/office/powerpoint/2010/main" val="2511366964"/>
+      </p:ext>
+    </p:extLst>
+  </p:cSld>
+  <p:clrMapOvr>
+    <a:masterClrMapping/>
+  </p:clrMapOvr>
+  <mc:AlternateContent xmlns:mc="http://schemas.openxmlformats.org/markup-compatibility/2006">
+    <mc:Choice xmlns:p14="http://schemas.microsoft.com/office/powerpoint/2010/main" Requires="p14">
+      <p:transition spd="slow" p14:dur="1400">
+        <p14:doors dir="vert"/>
+      </p:transition>
+    </mc:Choice>
+    <mc:Fallback>
+      <p:transition spd="slow">
+        <p:fade/>
+      </p:transition>
+    </mc:Fallback>
+  </mc:AlternateContent>
+  <p:timing>
+    <p:tnLst>
+      <p:par>
+        <p:cTn id="1" dur="indefinite" restart="never" nodeType="tmRoot"/>
+      </p:par>
+    </p:tnLst>
+  </p:timing>
+</p:sld>
+</file>
+
+<file path=ppt/slides/slide3.xml><?xml version="1.0" encoding="utf-8"?>
+<p:sld xmlns:a="http://schemas.openxmlformats.org/drawingml/2006/main" xmlns:r="http://schemas.openxmlformats.org/officeDocument/2006/relationships" xmlns:p="http://schemas.openxmlformats.org/presentationml/2006/main">
+  <p:cSld>
+    <p:spTree>
+      <p:nvGrpSpPr>
+        <p:cNvPr id="1" name=""/>
+        <p:cNvGrpSpPr/>
+        <p:nvPr/>
+      </p:nvGrpSpPr>
+      <p:grpSpPr>
+        <a:xfrm>
+          <a:off x="0" y="0"/>
+          <a:ext cx="0" cy="0"/>
+          <a:chOff x="0" y="0"/>
+          <a:chExt cx="0" cy="0"/>
+        </a:xfrm>
+      </p:grpSpPr>
+      <p:sp>
+        <p:nvSpPr>
+          <p:cNvPr id="2" name="Titel 1"/>
+          <p:cNvSpPr>
+            <a:spLocks noGrp="1"/>
+          </p:cNvSpPr>
+          <p:nvPr>
+            <p:ph type="title"/>
+          </p:nvPr>
+        </p:nvSpPr>
+        <p:spPr/>
+        <p:txBody>
+          <a:bodyPr/>
+          <a:lstStyle/>
+          <a:p>
+            <a:r>
+              <a:rPr lang="de-AT" dirty="0" smtClean="0"/>
+              <a:t>Bausteinsicht</a:t>
+            </a:r>
+            <a:endParaRPr lang="en-US" dirty="0"/>
+          </a:p>
+        </p:txBody>
+      </p:sp>
+      <p:sp>
+        <p:nvSpPr>
+          <p:cNvPr id="3" name="Ellipse 2"/>
+          <p:cNvSpPr/>
+          <p:nvPr/>
+        </p:nvSpPr>
+        <p:spPr>
+          <a:xfrm>
+            <a:off x="11338560" y="5980176"/>
+            <a:ext cx="731520" cy="740664"/>
+          </a:xfrm>
+          <a:prstGeom prst="ellipse">
+            <a:avLst/>
+          </a:prstGeom>
+          <a:blipFill dpi="0" rotWithShape="1">
+            <a:blip r:embed="rId2">
+              <a:extLst>
+                <a:ext uri="{28A0092B-C50C-407E-A947-70E740481C1C}">
+                  <a14:useLocalDpi xmlns:a14="http://schemas.microsoft.com/office/drawing/2010/main" val="0"/>
+                </a:ext>
+              </a:extLst>
+            </a:blip>
+            <a:srcRect/>
+            <a:stretch>
+              <a:fillRect l="-61900" t="-1000" r="-138100" b="-69068"/>
+            </a:stretch>
+          </a:blipFill>
+        </p:spPr>
+        <p:style>
+          <a:lnRef idx="0">
+            <a:schemeClr val="dk2">
+              <a:shade val="80000"/>
+              <a:hueOff val="0"/>
+              <a:satOff val="0"/>
+              <a:lumOff val="0"/>
+              <a:alphaOff val="0"/>
+            </a:schemeClr>
+          </a:lnRef>
+          <a:fillRef idx="1">
+            <a:scrgbClr r="0" g="0" b="0"/>
+          </a:fillRef>
+          <a:effectRef idx="2">
+            <a:schemeClr val="dk2">
+              <a:tint val="40000"/>
+              <a:hueOff val="0"/>
+              <a:satOff val="0"/>
+              <a:lumOff val="0"/>
+              <a:alphaOff val="0"/>
+            </a:schemeClr>
+          </a:effectRef>
+          <a:fontRef idx="minor">
+            <a:schemeClr val="lt1">
+              <a:hueOff val="0"/>
+              <a:satOff val="0"/>
+              <a:lumOff val="0"/>
+              <a:alphaOff val="0"/>
+            </a:schemeClr>
+          </a:fontRef>
+        </p:style>
+      </p:sp>
+      <p:grpSp>
+        <p:nvGrpSpPr>
+          <p:cNvPr id="4" name="Gruppieren 3"/>
+          <p:cNvGrpSpPr/>
+          <p:nvPr/>
+        </p:nvGrpSpPr>
+        <p:grpSpPr>
+          <a:xfrm>
+            <a:off x="9505003" y="5700827"/>
+            <a:ext cx="1633243" cy="1240312"/>
+            <a:chOff x="884454" y="1809226"/>
+            <a:chExt cx="1633243" cy="1240312"/>
+          </a:xfrm>
+        </p:grpSpPr>
+        <p:sp>
+          <p:nvSpPr>
+            <p:cNvPr id="5" name="Rechteck 4"/>
+            <p:cNvSpPr/>
+            <p:nvPr/>
+          </p:nvSpPr>
+          <p:spPr>
+            <a:xfrm>
+              <a:off x="884454" y="1809226"/>
+              <a:ext cx="1633243" cy="1181262"/>
+            </a:xfrm>
+            <a:prstGeom prst="rect">
+              <a:avLst/>
+            </a:prstGeom>
+          </p:spPr>
+          <p:style>
+            <a:lnRef idx="0">
+              <a:schemeClr val="dk2">
+                <a:alpha val="0"/>
+                <a:hueOff val="0"/>
+                <a:satOff val="0"/>
+                <a:lumOff val="0"/>
+                <a:alphaOff val="0"/>
+              </a:schemeClr>
+            </a:lnRef>
+            <a:fillRef idx="0">
+              <a:schemeClr val="lt1">
+                <a:alpha val="0"/>
+                <a:hueOff val="0"/>
+                <a:satOff val="0"/>
+                <a:lumOff val="0"/>
+                <a:alphaOff val="0"/>
+              </a:schemeClr>
+            </a:fillRef>
+            <a:effectRef idx="0">
+              <a:schemeClr val="lt1">
+                <a:alpha val="0"/>
+                <a:hueOff val="0"/>
+                <a:satOff val="0"/>
+                <a:lumOff val="0"/>
+                <a:alphaOff val="0"/>
+              </a:schemeClr>
+            </a:effectRef>
+            <a:fontRef idx="minor">
+              <a:schemeClr val="tx1">
+                <a:hueOff val="0"/>
+                <a:satOff val="0"/>
+                <a:lumOff val="0"/>
+                <a:alphaOff val="0"/>
+              </a:schemeClr>
+            </a:fontRef>
+          </p:style>
+        </p:sp>
+        <p:sp>
+          <p:nvSpPr>
+            <p:cNvPr id="6" name="Rechteck 5"/>
+            <p:cNvSpPr/>
+            <p:nvPr/>
+          </p:nvSpPr>
+          <p:spPr>
+            <a:xfrm>
+              <a:off x="884454" y="1868276"/>
+              <a:ext cx="1633243" cy="1181262"/>
+            </a:xfrm>
+            <a:prstGeom prst="rect">
+              <a:avLst/>
+            </a:prstGeom>
+          </p:spPr>
+          <p:style>
+            <a:lnRef idx="0">
+              <a:scrgbClr r="0" g="0" b="0"/>
+            </a:lnRef>
+            <a:fillRef idx="0">
+              <a:scrgbClr r="0" g="0" b="0"/>
+            </a:fillRef>
+            <a:effectRef idx="0">
+              <a:scrgbClr r="0" g="0" b="0"/>
+            </a:effectRef>
+            <a:fontRef idx="minor">
+              <a:schemeClr val="tx1">
+                <a:hueOff val="0"/>
+                <a:satOff val="0"/>
+                <a:lumOff val="0"/>
+                <a:alphaOff val="0"/>
+              </a:schemeClr>
+            </a:fontRef>
+          </p:style>
+          <p:txBody>
+            <a:bodyPr spcFirstLastPara="0" vert="horz" wrap="square" lIns="17780" tIns="17780" rIns="17780" bIns="17780" numCol="1" spcCol="1270" anchor="ctr" anchorCtr="0">
+              <a:noAutofit/>
+            </a:bodyPr>
+            <a:lstStyle/>
+            <a:p>
+              <a:pPr lvl="0" algn="r" defTabSz="622300">
+                <a:lnSpc>
+                  <a:spcPct val="90000"/>
+                </a:lnSpc>
+                <a:spcBef>
+                  <a:spcPct val="0"/>
+                </a:spcBef>
+                <a:spcAft>
+                  <a:spcPct val="10000"/>
+                </a:spcAft>
+              </a:pPr>
+              <a:r>
+                <a:rPr lang="de-DE" sz="1400" b="0" i="0" kern="1200" dirty="0" smtClean="0">
+                  <a:latin typeface="Century Gothic"/>
+                  <a:ea typeface="+mn-ea"/>
+                  <a:cs typeface="+mn-cs"/>
+                </a:rPr>
+                <a:t>Bausteinsicht</a:t>
+              </a:r>
+              <a:endParaRPr lang="de-DE" sz="1400" b="0" i="0" kern="1200" dirty="0">
+                <a:latin typeface="Century Gothic"/>
+                <a:ea typeface="+mn-ea"/>
+                <a:cs typeface="+mn-cs"/>
+              </a:endParaRPr>
+            </a:p>
+          </p:txBody>
+        </p:sp>
+      </p:grpSp>
+    </p:spTree>
+    <p:extLst>
+      <p:ext uri="{BB962C8B-B14F-4D97-AF65-F5344CB8AC3E}">
+        <p14:creationId xmlns:p14="http://schemas.microsoft.com/office/powerpoint/2010/main" val="228461012"/>
+      </p:ext>
+    </p:extLst>
+  </p:cSld>
+  <p:clrMapOvr>
+    <a:masterClrMapping/>
+  </p:clrMapOvr>
+  <mc:AlternateContent xmlns:mc="http://schemas.openxmlformats.org/markup-compatibility/2006">
+    <mc:Choice xmlns:p14="http://schemas.microsoft.com/office/powerpoint/2010/main" Requires="p14">
+      <p:transition spd="slow" p14:dur="1400">
+        <p14:doors dir="vert"/>
+      </p:transition>
+    </mc:Choice>
+    <mc:Fallback>
+      <p:transition spd="slow">
+        <p:fade/>
+      </p:transition>
+    </mc:Fallback>
+  </mc:AlternateContent>
+  <p:timing>
+    <p:tnLst>
+      <p:par>
+        <p:cTn id="1" dur="indefinite" restart="never" nodeType="tmRoot"/>
+      </p:par>
+    </p:tnLst>
+  </p:timing>
+</p:sld>
+</file>
+
+<file path=ppt/slides/slide4.xml><?xml version="1.0" encoding="utf-8"?>
+<p:sld xmlns:a="http://schemas.openxmlformats.org/drawingml/2006/main" xmlns:r="http://schemas.openxmlformats.org/officeDocument/2006/relationships" xmlns:p="http://schemas.openxmlformats.org/presentationml/2006/main">
+  <p:cSld>
+    <p:spTree>
+      <p:nvGrpSpPr>
+        <p:cNvPr id="1" name=""/>
+        <p:cNvGrpSpPr/>
+        <p:nvPr/>
+      </p:nvGrpSpPr>
+      <p:grpSpPr>
+        <a:xfrm>
+          <a:off x="0" y="0"/>
+          <a:ext cx="0" cy="0"/>
+          <a:chOff x="0" y="0"/>
+          <a:chExt cx="0" cy="0"/>
+        </a:xfrm>
+      </p:grpSpPr>
+      <p:sp>
+        <p:nvSpPr>
+          <p:cNvPr id="2" name="Titel 1"/>
+          <p:cNvSpPr>
+            <a:spLocks noGrp="1"/>
+          </p:cNvSpPr>
+          <p:nvPr>
+            <p:ph type="title"/>
+          </p:nvPr>
+        </p:nvSpPr>
+        <p:spPr/>
+        <p:txBody>
+          <a:bodyPr/>
+          <a:lstStyle/>
+          <a:p>
+            <a:r>
+              <a:rPr lang="de-AT" dirty="0" smtClean="0"/>
+              <a:t>Laufzeitsicht</a:t>
+            </a:r>
+            <a:endParaRPr lang="en-US" dirty="0"/>
+          </a:p>
+        </p:txBody>
+      </p:sp>
+      <p:sp>
+        <p:nvSpPr>
+          <p:cNvPr id="3" name="Ellipse 2"/>
+          <p:cNvSpPr/>
+          <p:nvPr/>
+        </p:nvSpPr>
+        <p:spPr>
+          <a:xfrm>
+            <a:off x="11292840" y="5980176"/>
+            <a:ext cx="740664" cy="740664"/>
+          </a:xfrm>
+          <a:prstGeom prst="ellipse">
+            <a:avLst/>
+          </a:prstGeom>
+          <a:blipFill dpi="0" rotWithShape="1">
+            <a:blip r:embed="rId2" cstate="print">
+              <a:extLst>
+                <a:ext uri="{28A0092B-C50C-407E-A947-70E740481C1C}">
+                  <a14:useLocalDpi xmlns:a14="http://schemas.microsoft.com/office/drawing/2010/main" val="0"/>
+                </a:ext>
+              </a:extLst>
+            </a:blip>
+            <a:srcRect/>
+            <a:stretch>
+              <a:fillRect l="-68197" t="-74000"/>
+            </a:stretch>
+          </a:blipFill>
+        </p:spPr>
+        <p:style>
+          <a:lnRef idx="0">
+            <a:schemeClr val="dk2">
+              <a:shade val="80000"/>
+              <a:hueOff val="0"/>
+              <a:satOff val="0"/>
+              <a:lumOff val="0"/>
+              <a:alphaOff val="0"/>
+            </a:schemeClr>
+          </a:lnRef>
+          <a:fillRef idx="1">
+            <a:scrgbClr r="0" g="0" b="0"/>
+          </a:fillRef>
+          <a:effectRef idx="2">
+            <a:schemeClr val="dk2">
+              <a:tint val="40000"/>
+              <a:hueOff val="0"/>
+              <a:satOff val="0"/>
+              <a:lumOff val="0"/>
+              <a:alphaOff val="0"/>
+            </a:schemeClr>
+          </a:effectRef>
+          <a:fontRef idx="minor">
+            <a:schemeClr val="lt1">
+              <a:hueOff val="0"/>
+              <a:satOff val="0"/>
+              <a:lumOff val="0"/>
+              <a:alphaOff val="0"/>
+            </a:schemeClr>
+          </a:fontRef>
+        </p:style>
+      </p:sp>
+      <p:grpSp>
+        <p:nvGrpSpPr>
+          <p:cNvPr id="4" name="Gruppieren 3"/>
+          <p:cNvGrpSpPr/>
+          <p:nvPr/>
+        </p:nvGrpSpPr>
+        <p:grpSpPr>
+          <a:xfrm>
+            <a:off x="9360767" y="5759877"/>
+            <a:ext cx="1782658" cy="1298997"/>
+            <a:chOff x="1661688" y="3496797"/>
+            <a:chExt cx="1782658" cy="1298997"/>
+          </a:xfrm>
+        </p:grpSpPr>
+        <p:sp>
+          <p:nvSpPr>
+            <p:cNvPr id="5" name="Rechteck 4"/>
+            <p:cNvSpPr/>
+            <p:nvPr/>
+          </p:nvSpPr>
+          <p:spPr>
+            <a:xfrm>
+              <a:off x="1661688" y="3614532"/>
+              <a:ext cx="1633243" cy="1181262"/>
+            </a:xfrm>
+            <a:prstGeom prst="rect">
+              <a:avLst/>
+            </a:prstGeom>
+          </p:spPr>
+          <p:style>
+            <a:lnRef idx="0">
+              <a:schemeClr val="dk2">
+                <a:alpha val="0"/>
+                <a:hueOff val="0"/>
+                <a:satOff val="0"/>
+                <a:lumOff val="0"/>
+                <a:alphaOff val="0"/>
+              </a:schemeClr>
+            </a:lnRef>
+            <a:fillRef idx="0">
+              <a:schemeClr val="lt1">
+                <a:alpha val="0"/>
+                <a:hueOff val="0"/>
+                <a:satOff val="0"/>
+                <a:lumOff val="0"/>
+                <a:alphaOff val="0"/>
+              </a:schemeClr>
+            </a:fillRef>
+            <a:effectRef idx="0">
+              <a:schemeClr val="lt1">
+                <a:alpha val="0"/>
+                <a:hueOff val="0"/>
+                <a:satOff val="0"/>
+                <a:lumOff val="0"/>
+                <a:alphaOff val="0"/>
+              </a:schemeClr>
+            </a:effectRef>
+            <a:fontRef idx="minor">
+              <a:schemeClr val="tx1">
+                <a:hueOff val="0"/>
+                <a:satOff val="0"/>
+                <a:lumOff val="0"/>
+                <a:alphaOff val="0"/>
+              </a:schemeClr>
+            </a:fontRef>
+          </p:style>
+        </p:sp>
+        <p:sp>
+          <p:nvSpPr>
+            <p:cNvPr id="6" name="Rechteck 5"/>
+            <p:cNvSpPr/>
+            <p:nvPr/>
+          </p:nvSpPr>
+          <p:spPr>
+            <a:xfrm>
+              <a:off x="1811103" y="3496797"/>
+              <a:ext cx="1633243" cy="1181262"/>
+            </a:xfrm>
+            <a:prstGeom prst="rect">
+              <a:avLst/>
+            </a:prstGeom>
+          </p:spPr>
+          <p:style>
+            <a:lnRef idx="0">
+              <a:scrgbClr r="0" g="0" b="0"/>
+            </a:lnRef>
+            <a:fillRef idx="0">
+              <a:scrgbClr r="0" g="0" b="0"/>
+            </a:fillRef>
+            <a:effectRef idx="0">
+              <a:scrgbClr r="0" g="0" b="0"/>
+            </a:effectRef>
+            <a:fontRef idx="minor">
+              <a:schemeClr val="tx1">
+                <a:hueOff val="0"/>
+                <a:satOff val="0"/>
+                <a:lumOff val="0"/>
+                <a:alphaOff val="0"/>
+              </a:schemeClr>
+            </a:fontRef>
+          </p:style>
+          <p:txBody>
+            <a:bodyPr spcFirstLastPara="0" vert="horz" wrap="square" lIns="17780" tIns="17780" rIns="17780" bIns="17780" numCol="1" spcCol="1270" anchor="ctr" anchorCtr="0">
+              <a:noAutofit/>
+            </a:bodyPr>
+            <a:lstStyle/>
+            <a:p>
+              <a:pPr lvl="0" algn="r" defTabSz="622300">
+                <a:lnSpc>
+                  <a:spcPct val="90000"/>
+                </a:lnSpc>
+                <a:spcBef>
+                  <a:spcPct val="0"/>
+                </a:spcBef>
+                <a:spcAft>
+                  <a:spcPct val="10000"/>
+                </a:spcAft>
+              </a:pPr>
+              <a:r>
+                <a:rPr lang="de-DE" sz="1400" b="0" i="0" kern="1200" dirty="0" smtClean="0">
+                  <a:latin typeface="Century Gothic"/>
+                  <a:ea typeface="+mn-ea"/>
+                  <a:cs typeface="+mn-cs"/>
+                </a:rPr>
+                <a:t>Laufzeitsicht</a:t>
+              </a:r>
+              <a:endParaRPr lang="de-DE" sz="1400" b="0" i="0" kern="1200" dirty="0">
+                <a:latin typeface="Century Gothic"/>
+                <a:ea typeface="+mn-ea"/>
+                <a:cs typeface="+mn-cs"/>
+              </a:endParaRPr>
+            </a:p>
+          </p:txBody>
+        </p:sp>
+      </p:grpSp>
+    </p:spTree>
+    <p:extLst>
+      <p:ext uri="{BB962C8B-B14F-4D97-AF65-F5344CB8AC3E}">
+        <p14:creationId xmlns:p14="http://schemas.microsoft.com/office/powerpoint/2010/main" val="1785085251"/>
+      </p:ext>
+    </p:extLst>
+  </p:cSld>
+  <p:clrMapOvr>
+    <a:masterClrMapping/>
+  </p:clrMapOvr>
+  <mc:AlternateContent xmlns:mc="http://schemas.openxmlformats.org/markup-compatibility/2006">
+    <mc:Choice xmlns:p14="http://schemas.microsoft.com/office/powerpoint/2010/main" Requires="p14">
+      <p:transition spd="slow" p14:dur="1400">
+        <p14:doors dir="vert"/>
+      </p:transition>
+    </mc:Choice>
+    <mc:Fallback>
+      <p:transition spd="slow">
+        <p:fade/>
+      </p:transition>
+    </mc:Fallback>
+  </mc:AlternateContent>
   <p:timing>
     <p:tnLst>
       <p:par>

</xml_diff>

<commit_message>
+) Updated arc42 template
</commit_message>
<xml_diff>
--- a/2nd_sem/sad/murrent_grill_pieber_lehner/presentations/EVA_design_v1.pptx
+++ b/2nd_sem/sad/murrent_grill_pieber_lehner/presentations/EVA_design_v1.pptx
@@ -6,19 +6,20 @@
     <p:sldMasterId id="2147483852" r:id="rId3"/>
   </p:sldMasterIdLst>
   <p:notesMasterIdLst>
-    <p:notesMasterId r:id="rId11"/>
+    <p:notesMasterId r:id="rId12"/>
   </p:notesMasterIdLst>
   <p:handoutMasterIdLst>
-    <p:handoutMasterId r:id="rId12"/>
+    <p:handoutMasterId r:id="rId13"/>
   </p:handoutMasterIdLst>
   <p:sldIdLst>
     <p:sldId id="257" r:id="rId4"/>
     <p:sldId id="258" r:id="rId5"/>
-    <p:sldId id="259" r:id="rId6"/>
-    <p:sldId id="261" r:id="rId7"/>
-    <p:sldId id="262" r:id="rId8"/>
-    <p:sldId id="260" r:id="rId9"/>
-    <p:sldId id="263" r:id="rId10"/>
+    <p:sldId id="264" r:id="rId6"/>
+    <p:sldId id="259" r:id="rId7"/>
+    <p:sldId id="261" r:id="rId8"/>
+    <p:sldId id="262" r:id="rId9"/>
+    <p:sldId id="260" r:id="rId10"/>
+    <p:sldId id="263" r:id="rId11"/>
   </p:sldIdLst>
   <p:sldSz cx="12192000" cy="6858000"/>
   <p:notesSz cx="6858000" cy="9144000"/>
@@ -3905,7 +3906,7 @@
           <a:p>
             <a:fld id="{52BBEB64-35AE-4293-AF4C-38F790147BED}" type="datetimeFigureOut">
               <a:rPr lang="de-DE"/>
-              <a:t>19.05.2014</a:t>
+              <a:t>20.05.2014</a:t>
             </a:fld>
             <a:endParaRPr/>
           </a:p>
@@ -4070,7 +4071,7 @@
           <a:p>
             <a:fld id="{BC2AE60B-075F-4DD5-8053-C8426E2D0DAD}" type="datetimeFigureOut">
               <a:rPr lang="de-DE"/>
-              <a:t>19.05.2014</a:t>
+              <a:t>20.05.2014</a:t>
             </a:fld>
             <a:endParaRPr/>
           </a:p>
@@ -4479,7 +4480,7 @@
           <a:p>
             <a:fld id="{A8224893-DBDA-4BFA-9CE1-4BFE7CD0F8CF}" type="datetime1">
               <a:rPr lang="de-DE" noProof="0" smtClean="0"/>
-              <a:t>19.05.2014</a:t>
+              <a:t>20.05.2014</a:t>
             </a:fld>
             <a:endParaRPr lang="de-DE" noProof="0" dirty="0"/>
           </a:p>
@@ -4656,7 +4657,7 @@
           <a:p>
             <a:fld id="{5F4E5243-F52A-4D37-9694-EB26C6C31910}" type="datetime1">
               <a:rPr lang="de-DE" noProof="0" smtClean="0"/>
-              <a:t>19.05.2014</a:t>
+              <a:t>20.05.2014</a:t>
             </a:fld>
             <a:endParaRPr lang="de-DE" noProof="0" dirty="0"/>
           </a:p>
@@ -4836,7 +4837,7 @@
           <a:p>
             <a:fld id="{3A77B6E1-634A-48DC-9E8B-D894023267EF}" type="datetime1">
               <a:rPr lang="de-DE" noProof="0" smtClean="0"/>
-              <a:t>19.05.2014</a:t>
+              <a:t>20.05.2014</a:t>
             </a:fld>
             <a:endParaRPr lang="de-DE" noProof="0" dirty="0"/>
           </a:p>
@@ -5083,7 +5084,7 @@
           <a:p>
             <a:fld id="{A8224893-DBDA-4BFA-9CE1-4BFE7CD0F8CF}" type="datetime1">
               <a:rPr lang="de-DE" noProof="0" smtClean="0"/>
-              <a:t>19.05.2014</a:t>
+              <a:t>20.05.2014</a:t>
             </a:fld>
             <a:endParaRPr lang="de-DE" noProof="0" dirty="0"/>
           </a:p>
@@ -5253,7 +5254,7 @@
           <a:p>
             <a:fld id="{7B2D3E9E-A95C-48F2-B4BF-A71542E0BE9A}" type="datetime1">
               <a:rPr lang="de-DE" noProof="0" smtClean="0"/>
-              <a:t>19.05.2014</a:t>
+              <a:t>20.05.2014</a:t>
             </a:fld>
             <a:endParaRPr lang="de-DE" noProof="0" dirty="0"/>
           </a:p>
@@ -5500,7 +5501,7 @@
           <a:p>
             <a:fld id="{5586B75A-687E-405C-8A0B-8D00578BA2C3}" type="datetime1">
               <a:rPr lang="de-DE" noProof="0" smtClean="0"/>
-              <a:t>19.05.2014</a:t>
+              <a:t>20.05.2014</a:t>
             </a:fld>
             <a:endParaRPr lang="de-DE" noProof="0" dirty="0"/>
           </a:p>
@@ -5793,7 +5794,7 @@
           <a:p>
             <a:fld id="{F12952B5-7A2F-4CC8-B7CE-9234E21C2837}" type="datetime1">
               <a:rPr lang="de-DE" noProof="0" smtClean="0"/>
-              <a:t>19.05.2014</a:t>
+              <a:t>20.05.2014</a:t>
             </a:fld>
             <a:endParaRPr lang="de-DE" noProof="0" dirty="0"/>
           </a:p>
@@ -6237,7 +6238,7 @@
           <a:p>
             <a:fld id="{CE1DA07A-9201-4B4B-BAF2-015AFA30F520}" type="datetime1">
               <a:rPr lang="de-DE" noProof="0" smtClean="0"/>
-              <a:t>19.05.2014</a:t>
+              <a:t>20.05.2014</a:t>
             </a:fld>
             <a:endParaRPr lang="de-DE" noProof="0" dirty="0"/>
           </a:p>
@@ -6355,7 +6356,7 @@
           <a:p>
             <a:fld id="{73D7E00A-486F-4252-8B1D-E32645521F49}" type="datetime1">
               <a:rPr lang="de-DE" noProof="0" smtClean="0"/>
-              <a:t>19.05.2014</a:t>
+              <a:t>20.05.2014</a:t>
             </a:fld>
             <a:endParaRPr lang="de-DE" noProof="0" dirty="0"/>
           </a:p>
@@ -6450,7 +6451,7 @@
           <a:p>
             <a:fld id="{8DDF5F92-E675-4B36-9A60-69A962A68675}" type="datetime1">
               <a:rPr lang="de-DE" noProof="0" smtClean="0"/>
-              <a:t>19.05.2014</a:t>
+              <a:t>20.05.2014</a:t>
             </a:fld>
             <a:endParaRPr lang="de-DE" noProof="0" dirty="0"/>
           </a:p>
@@ -6729,7 +6730,7 @@
           <a:p>
             <a:fld id="{AF6E2C9B-5FA2-460D-9BE7-B0812FC2A6FF}" type="datetime1">
               <a:rPr lang="de-DE" noProof="0" smtClean="0"/>
-              <a:t>19.05.2014</a:t>
+              <a:t>20.05.2014</a:t>
             </a:fld>
             <a:endParaRPr lang="de-DE" noProof="0" dirty="0"/>
           </a:p>
@@ -6899,7 +6900,7 @@
           <a:p>
             <a:fld id="{7B2D3E9E-A95C-48F2-B4BF-A71542E0BE9A}" type="datetime1">
               <a:rPr lang="de-DE" noProof="0" smtClean="0"/>
-              <a:t>19.05.2014</a:t>
+              <a:t>20.05.2014</a:t>
             </a:fld>
             <a:endParaRPr lang="de-DE" noProof="0" dirty="0"/>
           </a:p>
@@ -7181,7 +7182,7 @@
           <a:p>
             <a:fld id="{1D374940-A916-4C8B-9648-02A2D3898F9E}" type="datetime1">
               <a:rPr lang="de-DE" noProof="0" smtClean="0"/>
-              <a:t>19.05.2014</a:t>
+              <a:t>20.05.2014</a:t>
             </a:fld>
             <a:endParaRPr lang="de-DE" noProof="0" dirty="0"/>
           </a:p>
@@ -7456,7 +7457,7 @@
           <a:p>
             <a:fld id="{5586B75A-687E-405C-8A0B-8D00578BA2C3}" type="datetime1">
               <a:rPr lang="de-DE" noProof="0" smtClean="0"/>
-              <a:t>19.05.2014</a:t>
+              <a:t>20.05.2014</a:t>
             </a:fld>
             <a:endParaRPr lang="de-DE" noProof="0" dirty="0"/>
           </a:p>
@@ -7651,7 +7652,7 @@
           <a:p>
             <a:fld id="{5586B75A-687E-405C-8A0B-8D00578BA2C3}" type="datetime1">
               <a:rPr lang="de-DE" noProof="0" smtClean="0"/>
-              <a:t>19.05.2014</a:t>
+              <a:t>20.05.2014</a:t>
             </a:fld>
             <a:endParaRPr lang="de-DE" noProof="0" dirty="0"/>
           </a:p>
@@ -7925,7 +7926,7 @@
           <a:p>
             <a:fld id="{5586B75A-687E-405C-8A0B-8D00578BA2C3}" type="datetime1">
               <a:rPr lang="de-DE" noProof="0" smtClean="0"/>
-              <a:t>19.05.2014</a:t>
+              <a:t>20.05.2014</a:t>
             </a:fld>
             <a:endParaRPr lang="de-DE" noProof="0" dirty="0"/>
           </a:p>
@@ -8267,7 +8268,7 @@
           <a:p>
             <a:fld id="{5586B75A-687E-405C-8A0B-8D00578BA2C3}" type="datetime1">
               <a:rPr lang="de-DE" noProof="0" smtClean="0"/>
-              <a:t>19.05.2014</a:t>
+              <a:t>20.05.2014</a:t>
             </a:fld>
             <a:endParaRPr lang="de-DE" noProof="0" dirty="0"/>
           </a:p>
@@ -8891,7 +8892,7 @@
           <a:p>
             <a:fld id="{5586B75A-687E-405C-8A0B-8D00578BA2C3}" type="datetime1">
               <a:rPr lang="de-DE" noProof="0" smtClean="0"/>
-              <a:t>19.05.2014</a:t>
+              <a:t>20.05.2014</a:t>
             </a:fld>
             <a:endParaRPr lang="de-DE" noProof="0" dirty="0"/>
           </a:p>
@@ -9752,7 +9753,7 @@
           <a:p>
             <a:fld id="{5586B75A-687E-405C-8A0B-8D00578BA2C3}" type="datetime1">
               <a:rPr lang="de-DE" noProof="0" smtClean="0"/>
-              <a:t>19.05.2014</a:t>
+              <a:t>20.05.2014</a:t>
             </a:fld>
             <a:endParaRPr lang="de-DE" noProof="0" dirty="0"/>
           </a:p>
@@ -9923,7 +9924,7 @@
           <a:p>
             <a:fld id="{5F4E5243-F52A-4D37-9694-EB26C6C31910}" type="datetime1">
               <a:rPr lang="de-DE" noProof="0" smtClean="0"/>
-              <a:t>19.05.2014</a:t>
+              <a:t>20.05.2014</a:t>
             </a:fld>
             <a:endParaRPr lang="de-DE" noProof="0" dirty="0"/>
           </a:p>
@@ -10103,7 +10104,7 @@
           <a:p>
             <a:fld id="{3A77B6E1-634A-48DC-9E8B-D894023267EF}" type="datetime1">
               <a:rPr lang="de-DE" noProof="0" smtClean="0"/>
-              <a:t>19.05.2014</a:t>
+              <a:t>20.05.2014</a:t>
             </a:fld>
             <a:endParaRPr lang="de-DE" noProof="0" dirty="0"/>
           </a:p>
@@ -10354,7 +10355,7 @@
           <a:p>
             <a:fld id="{A50F84E2-2D7A-43CF-AC90-352A289A783A}" type="datetime1">
               <a:rPr lang="de-DE" noProof="0" smtClean="0"/>
-              <a:t>19.05.2014</a:t>
+              <a:t>20.05.2014</a:t>
             </a:fld>
             <a:endParaRPr lang="de-DE" noProof="0" dirty="0"/>
           </a:p>
@@ -10653,7 +10654,7 @@
           <a:p>
             <a:fld id="{F12952B5-7A2F-4CC8-B7CE-9234E21C2837}" type="datetime1">
               <a:rPr lang="de-DE" noProof="0" smtClean="0"/>
-              <a:t>19.05.2014</a:t>
+              <a:t>20.05.2014</a:t>
             </a:fld>
             <a:endParaRPr lang="de-DE" noProof="0" dirty="0"/>
           </a:p>
@@ -11061,7 +11062,7 @@
           <a:p>
             <a:fld id="{CE1DA07A-9201-4B4B-BAF2-015AFA30F520}" type="datetime1">
               <a:rPr lang="de-DE" noProof="0" smtClean="0"/>
-              <a:t>19.05.2014</a:t>
+              <a:t>20.05.2014</a:t>
             </a:fld>
             <a:endParaRPr lang="de-DE" noProof="0" dirty="0"/>
           </a:p>
@@ -11186,7 +11187,7 @@
           <a:p>
             <a:fld id="{73D7E00A-486F-4252-8B1D-E32645521F49}" type="datetime1">
               <a:rPr lang="de-DE" noProof="0" smtClean="0"/>
-              <a:t>19.05.2014</a:t>
+              <a:t>20.05.2014</a:t>
             </a:fld>
             <a:endParaRPr lang="de-DE" noProof="0" dirty="0"/>
           </a:p>
@@ -11311,7 +11312,7 @@
           <a:p>
             <a:fld id="{8DDF5F92-E675-4B36-9A60-69A962A68675}" type="datetime1">
               <a:rPr lang="de-DE" noProof="0" smtClean="0"/>
-              <a:t>19.05.2014</a:t>
+              <a:t>20.05.2014</a:t>
             </a:fld>
             <a:endParaRPr lang="de-DE" noProof="0" dirty="0"/>
           </a:p>
@@ -11597,7 +11598,7 @@
           <a:p>
             <a:fld id="{AF6E2C9B-5FA2-460D-9BE7-B0812FC2A6FF}" type="datetime1">
               <a:rPr lang="de-DE" noProof="0" smtClean="0"/>
-              <a:t>19.05.2014</a:t>
+              <a:t>20.05.2014</a:t>
             </a:fld>
             <a:endParaRPr lang="de-DE" noProof="0" dirty="0"/>
           </a:p>
@@ -11870,7 +11871,7 @@
           <a:p>
             <a:fld id="{1D374940-A916-4C8B-9648-02A2D3898F9E}" type="datetime1">
               <a:rPr lang="de-DE" noProof="0" smtClean="0"/>
-              <a:t>19.05.2014</a:t>
+              <a:t>20.05.2014</a:t>
             </a:fld>
             <a:endParaRPr lang="de-DE" noProof="0" dirty="0"/>
           </a:p>
@@ -12091,7 +12092,7 @@
           <a:p>
             <a:fld id="{5586B75A-687E-405C-8A0B-8D00578BA2C3}" type="datetime1">
               <a:rPr lang="de-DE" noProof="0" smtClean="0"/>
-              <a:t>19.05.2014</a:t>
+              <a:t>20.05.2014</a:t>
             </a:fld>
             <a:endParaRPr lang="de-DE" noProof="0" dirty="0"/>
           </a:p>
@@ -12844,7 +12845,7 @@
           <a:p>
             <a:fld id="{5586B75A-687E-405C-8A0B-8D00578BA2C3}" type="datetime1">
               <a:rPr lang="de-DE" noProof="0" smtClean="0"/>
-              <a:t>19.05.2014</a:t>
+              <a:t>20.05.2014</a:t>
             </a:fld>
             <a:endParaRPr lang="de-DE" noProof="0" dirty="0"/>
           </a:p>
@@ -13833,6 +13834,334 @@
           <a:p>
             <a:r>
               <a:rPr lang="de-AT" dirty="0" smtClean="0"/>
+              <a:t>Kontextabgrenzung</a:t>
+            </a:r>
+            <a:endParaRPr lang="en-US" dirty="0"/>
+          </a:p>
+        </p:txBody>
+      </p:sp>
+      <p:sp>
+        <p:nvSpPr>
+          <p:cNvPr id="3" name="Ellipse 2"/>
+          <p:cNvSpPr/>
+          <p:nvPr/>
+        </p:nvSpPr>
+        <p:spPr>
+          <a:xfrm>
+            <a:off x="11292172" y="5980090"/>
+            <a:ext cx="737763" cy="737969"/>
+          </a:xfrm>
+          <a:prstGeom prst="ellipse">
+            <a:avLst/>
+          </a:prstGeom>
+          <a:blipFill>
+            <a:blip r:embed="rId2">
+              <a:extLst>
+                <a:ext uri="{BEBA8EAE-BF5A-486C-A8C5-ECC9F3942E4B}">
+                  <a14:imgProps xmlns:a14="http://schemas.microsoft.com/office/drawing/2010/main">
+                    <a14:imgLayer r:embed="rId3">
+                      <a14:imgEffect>
+                        <a14:saturation sat="400000"/>
+                      </a14:imgEffect>
+                    </a14:imgLayer>
+                  </a14:imgProps>
+                </a:ext>
+                <a:ext uri="{28A0092B-C50C-407E-A947-70E740481C1C}">
+                  <a14:useLocalDpi xmlns:a14="http://schemas.microsoft.com/office/drawing/2010/main" val="0"/>
+                </a:ext>
+              </a:extLst>
+            </a:blip>
+            <a:stretch>
+              <a:fillRect l="-189000" r="-189000"/>
+            </a:stretch>
+          </a:blipFill>
+          <a:effectLst>
+            <a:glow>
+              <a:schemeClr val="accent1"/>
+            </a:glow>
+          </a:effectLst>
+        </p:spPr>
+        <p:style>
+          <a:lnRef idx="0">
+            <a:schemeClr val="dk2">
+              <a:shade val="80000"/>
+              <a:hueOff val="0"/>
+              <a:satOff val="0"/>
+              <a:lumOff val="0"/>
+              <a:alphaOff val="0"/>
+            </a:schemeClr>
+          </a:lnRef>
+          <a:fillRef idx="1">
+            <a:scrgbClr r="0" g="0" b="0"/>
+          </a:fillRef>
+          <a:effectRef idx="2">
+            <a:scrgbClr r="0" g="0" b="0"/>
+          </a:effectRef>
+          <a:fontRef idx="minor">
+            <a:schemeClr val="lt1">
+              <a:hueOff val="0"/>
+              <a:satOff val="0"/>
+              <a:lumOff val="0"/>
+              <a:alphaOff val="0"/>
+            </a:schemeClr>
+          </a:fontRef>
+        </p:style>
+      </p:sp>
+      <p:grpSp>
+        <p:nvGrpSpPr>
+          <p:cNvPr id="4" name="Gruppieren 3"/>
+          <p:cNvGrpSpPr/>
+          <p:nvPr/>
+        </p:nvGrpSpPr>
+        <p:grpSpPr>
+          <a:xfrm>
+            <a:off x="8202221" y="5536797"/>
+            <a:ext cx="2923652" cy="1181262"/>
+            <a:chOff x="481104" y="442733"/>
+            <a:chExt cx="2923652" cy="1181262"/>
+          </a:xfrm>
+        </p:grpSpPr>
+        <p:sp>
+          <p:nvSpPr>
+            <p:cNvPr id="5" name="Rechteck 4"/>
+            <p:cNvSpPr/>
+            <p:nvPr/>
+          </p:nvSpPr>
+          <p:spPr>
+            <a:xfrm>
+              <a:off x="481104" y="442733"/>
+              <a:ext cx="2500903" cy="1181262"/>
+            </a:xfrm>
+            <a:prstGeom prst="rect">
+              <a:avLst/>
+            </a:prstGeom>
+          </p:spPr>
+          <p:style>
+            <a:lnRef idx="0">
+              <a:schemeClr val="dk2">
+                <a:alpha val="0"/>
+                <a:hueOff val="0"/>
+                <a:satOff val="0"/>
+                <a:lumOff val="0"/>
+                <a:alphaOff val="0"/>
+              </a:schemeClr>
+            </a:lnRef>
+            <a:fillRef idx="0">
+              <a:schemeClr val="lt1">
+                <a:alpha val="0"/>
+                <a:hueOff val="0"/>
+                <a:satOff val="0"/>
+                <a:lumOff val="0"/>
+                <a:alphaOff val="0"/>
+              </a:schemeClr>
+            </a:fillRef>
+            <a:effectRef idx="0">
+              <a:schemeClr val="lt1">
+                <a:alpha val="0"/>
+                <a:hueOff val="0"/>
+                <a:satOff val="0"/>
+                <a:lumOff val="0"/>
+                <a:alphaOff val="0"/>
+              </a:schemeClr>
+            </a:effectRef>
+            <a:fontRef idx="minor">
+              <a:schemeClr val="tx1">
+                <a:hueOff val="0"/>
+                <a:satOff val="0"/>
+                <a:lumOff val="0"/>
+                <a:alphaOff val="0"/>
+              </a:schemeClr>
+            </a:fontRef>
+          </p:style>
+        </p:sp>
+        <p:sp>
+          <p:nvSpPr>
+            <p:cNvPr id="6" name="Rechteck 5"/>
+            <p:cNvSpPr/>
+            <p:nvPr/>
+          </p:nvSpPr>
+          <p:spPr>
+            <a:xfrm>
+              <a:off x="1557452" y="895837"/>
+              <a:ext cx="1847304" cy="718346"/>
+            </a:xfrm>
+            <a:prstGeom prst="rect">
+              <a:avLst/>
+            </a:prstGeom>
+          </p:spPr>
+          <p:style>
+            <a:lnRef idx="0">
+              <a:scrgbClr r="0" g="0" b="0"/>
+            </a:lnRef>
+            <a:fillRef idx="0">
+              <a:scrgbClr r="0" g="0" b="0"/>
+            </a:fillRef>
+            <a:effectRef idx="0">
+              <a:scrgbClr r="0" g="0" b="0"/>
+            </a:effectRef>
+            <a:fontRef idx="minor">
+              <a:schemeClr val="tx1">
+                <a:hueOff val="0"/>
+                <a:satOff val="0"/>
+                <a:lumOff val="0"/>
+                <a:alphaOff val="0"/>
+              </a:schemeClr>
+            </a:fontRef>
+          </p:style>
+          <p:txBody>
+            <a:bodyPr spcFirstLastPara="0" vert="horz" wrap="square" lIns="17780" tIns="17780" rIns="17780" bIns="17780" numCol="1" spcCol="1270" anchor="ctr" anchorCtr="0">
+              <a:noAutofit/>
+            </a:bodyPr>
+            <a:lstStyle/>
+            <a:p>
+              <a:pPr lvl="0" algn="r" defTabSz="622300">
+                <a:lnSpc>
+                  <a:spcPct val="90000"/>
+                </a:lnSpc>
+                <a:spcBef>
+                  <a:spcPct val="0"/>
+                </a:spcBef>
+                <a:spcAft>
+                  <a:spcPct val="10000"/>
+                </a:spcAft>
+              </a:pPr>
+              <a:r>
+                <a:rPr lang="de-DE" sz="1400" b="0" i="0" kern="1200" dirty="0" smtClean="0">
+                  <a:latin typeface="Century Gothic"/>
+                  <a:ea typeface="+mn-ea"/>
+                  <a:cs typeface="+mn-cs"/>
+                </a:rPr>
+                <a:t>Kontextabgrenzung</a:t>
+              </a:r>
+              <a:endParaRPr lang="de-DE" sz="1400" b="0" i="0" kern="1200" dirty="0">
+                <a:latin typeface="Century Gothic"/>
+                <a:ea typeface="+mn-ea"/>
+                <a:cs typeface="+mn-cs"/>
+              </a:endParaRPr>
+            </a:p>
+          </p:txBody>
+        </p:sp>
+      </p:grpSp>
+      <p:pic>
+        <p:nvPicPr>
+          <p:cNvPr id="7" name="Grafik 6"/>
+          <p:cNvPicPr>
+            <a:picLocks noChangeAspect="1"/>
+          </p:cNvPicPr>
+          <p:nvPr/>
+        </p:nvPicPr>
+        <p:blipFill>
+          <a:blip r:embed="rId4">
+            <a:extLst>
+              <a:ext uri="{28A0092B-C50C-407E-A947-70E740481C1C}">
+                <a14:useLocalDpi xmlns:a14="http://schemas.microsoft.com/office/drawing/2010/main" val="0"/>
+              </a:ext>
+            </a:extLst>
+          </a:blip>
+          <a:stretch>
+            <a:fillRect/>
+          </a:stretch>
+        </p:blipFill>
+        <p:spPr>
+          <a:xfrm>
+            <a:off x="1698700" y="1522693"/>
+            <a:ext cx="7445300" cy="4280365"/>
+          </a:xfrm>
+          <a:prstGeom prst="rect">
+            <a:avLst/>
+          </a:prstGeom>
+          <a:ln w="127000" cap="rnd">
+            <a:solidFill>
+              <a:srgbClr val="FFFFFF"/>
+            </a:solidFill>
+          </a:ln>
+          <a:effectLst>
+            <a:outerShdw blurRad="76200" dist="95250" dir="10500000" sx="97000" sy="23000" kx="900000" algn="br" rotWithShape="0">
+              <a:srgbClr val="000000">
+                <a:alpha val="20000"/>
+              </a:srgbClr>
+            </a:outerShdw>
+          </a:effectLst>
+          <a:scene3d>
+            <a:camera prst="orthographicFront"/>
+            <a:lightRig rig="twoPt" dir="t">
+              <a:rot lat="0" lon="0" rev="7800000"/>
+            </a:lightRig>
+          </a:scene3d>
+          <a:sp3d contourW="6350">
+            <a:bevelT w="50800" h="16510"/>
+            <a:contourClr>
+              <a:srgbClr val="C0C0C0"/>
+            </a:contourClr>
+          </a:sp3d>
+        </p:spPr>
+      </p:pic>
+    </p:spTree>
+    <p:extLst>
+      <p:ext uri="{BB962C8B-B14F-4D97-AF65-F5344CB8AC3E}">
+        <p14:creationId xmlns:p14="http://schemas.microsoft.com/office/powerpoint/2010/main" val="2242728421"/>
+      </p:ext>
+    </p:extLst>
+  </p:cSld>
+  <p:clrMapOvr>
+    <a:masterClrMapping/>
+  </p:clrMapOvr>
+  <mc:AlternateContent xmlns:mc="http://schemas.openxmlformats.org/markup-compatibility/2006">
+    <mc:Choice xmlns:p14="http://schemas.microsoft.com/office/powerpoint/2010/main" Requires="p14">
+      <p:transition spd="slow" p14:dur="1400">
+        <p14:doors dir="vert"/>
+      </p:transition>
+    </mc:Choice>
+    <mc:Fallback>
+      <p:transition spd="slow">
+        <p:fade/>
+      </p:transition>
+    </mc:Fallback>
+  </mc:AlternateContent>
+  <p:timing>
+    <p:tnLst>
+      <p:par>
+        <p:cTn id="1" dur="indefinite" restart="never" nodeType="tmRoot"/>
+      </p:par>
+    </p:tnLst>
+  </p:timing>
+</p:sld>
+</file>
+
+<file path=ppt/slides/slide4.xml><?xml version="1.0" encoding="utf-8"?>
+<p:sld xmlns:a="http://schemas.openxmlformats.org/drawingml/2006/main" xmlns:r="http://schemas.openxmlformats.org/officeDocument/2006/relationships" xmlns:p="http://schemas.openxmlformats.org/presentationml/2006/main">
+  <p:cSld>
+    <p:spTree>
+      <p:nvGrpSpPr>
+        <p:cNvPr id="1" name=""/>
+        <p:cNvGrpSpPr/>
+        <p:nvPr/>
+      </p:nvGrpSpPr>
+      <p:grpSpPr>
+        <a:xfrm>
+          <a:off x="0" y="0"/>
+          <a:ext cx="0" cy="0"/>
+          <a:chOff x="0" y="0"/>
+          <a:chExt cx="0" cy="0"/>
+        </a:xfrm>
+      </p:grpSpPr>
+      <p:sp>
+        <p:nvSpPr>
+          <p:cNvPr id="2" name="Titel 1"/>
+          <p:cNvSpPr>
+            <a:spLocks noGrp="1"/>
+          </p:cNvSpPr>
+          <p:nvPr>
+            <p:ph type="title"/>
+          </p:nvPr>
+        </p:nvSpPr>
+        <p:spPr/>
+        <p:txBody>
+          <a:bodyPr/>
+          <a:lstStyle/>
+          <a:p>
+            <a:r>
+              <a:rPr lang="de-AT" dirty="0" smtClean="0"/>
               <a:t>Bausteinsicht</a:t>
             </a:r>
             <a:endParaRPr lang="en-US" dirty="0"/>
@@ -14120,7 +14449,7 @@
 </p:sld>
 </file>
 
-<file path=ppt/slides/slide4.xml><?xml version="1.0" encoding="utf-8"?>
+<file path=ppt/slides/slide5.xml><?xml version="1.0" encoding="utf-8"?>
 <p:sld xmlns:a="http://schemas.openxmlformats.org/drawingml/2006/main" xmlns:r="http://schemas.openxmlformats.org/officeDocument/2006/relationships" xmlns:p="http://schemas.openxmlformats.org/presentationml/2006/main">
   <p:cSld>
     <p:spTree>
@@ -14419,13 +14748,13 @@
   <p:clrMapOvr>
     <a:masterClrMapping/>
   </p:clrMapOvr>
-  <mc:AlternateContent xmlns:mc="http://schemas.openxmlformats.org/markup-compatibility/2006">
-    <mc:Choice xmlns:p14="http://schemas.microsoft.com/office/powerpoint/2010/main" Requires="p14">
+  <mc:AlternateContent xmlns:mc="http://schemas.openxmlformats.org/markup-compatibility/2006" xmlns:p14="http://schemas.microsoft.com/office/powerpoint/2010/main">
+    <mc:Choice Requires="p14">
       <p:transition spd="slow" p14:dur="1400">
         <p14:doors dir="vert"/>
       </p:transition>
     </mc:Choice>
-    <mc:Fallback>
+    <mc:Fallback xmlns="">
       <p:transition spd="slow">
         <p:fade/>
       </p:transition>
@@ -14441,7 +14770,7 @@
 </p:sld>
 </file>
 
-<file path=ppt/slides/slide5.xml><?xml version="1.0" encoding="utf-8"?>
+<file path=ppt/slides/slide6.xml><?xml version="1.0" encoding="utf-8"?>
 <p:sld xmlns:a="http://schemas.openxmlformats.org/drawingml/2006/main" xmlns:r="http://schemas.openxmlformats.org/officeDocument/2006/relationships" xmlns:p="http://schemas.openxmlformats.org/presentationml/2006/main">
   <p:cSld>
     <p:spTree>
@@ -14740,13 +15069,13 @@
   <p:clrMapOvr>
     <a:masterClrMapping/>
   </p:clrMapOvr>
-  <mc:AlternateContent xmlns:mc="http://schemas.openxmlformats.org/markup-compatibility/2006">
-    <mc:Choice xmlns:p14="http://schemas.microsoft.com/office/powerpoint/2010/main" Requires="p14">
+  <mc:AlternateContent xmlns:mc="http://schemas.openxmlformats.org/markup-compatibility/2006" xmlns:p14="http://schemas.microsoft.com/office/powerpoint/2010/main">
+    <mc:Choice Requires="p14">
       <p:transition spd="slow" p14:dur="1400">
         <p14:doors dir="vert"/>
       </p:transition>
     </mc:Choice>
-    <mc:Fallback>
+    <mc:Fallback xmlns="">
       <p:transition spd="slow">
         <p:fade/>
       </p:transition>
@@ -14762,7 +15091,7 @@
 </p:sld>
 </file>
 
-<file path=ppt/slides/slide6.xml><?xml version="1.0" encoding="utf-8"?>
+<file path=ppt/slides/slide7.xml><?xml version="1.0" encoding="utf-8"?>
 <p:sld xmlns:a="http://schemas.openxmlformats.org/drawingml/2006/main" xmlns:r="http://schemas.openxmlformats.org/officeDocument/2006/relationships" xmlns:p="http://schemas.openxmlformats.org/presentationml/2006/main">
   <p:cSld>
     <p:spTree>
@@ -15083,7 +15412,7 @@
 </p:sld>
 </file>
 
-<file path=ppt/slides/slide7.xml><?xml version="1.0" encoding="utf-8"?>
+<file path=ppt/slides/slide8.xml><?xml version="1.0" encoding="utf-8"?>
 <p:sld xmlns:a="http://schemas.openxmlformats.org/drawingml/2006/main" xmlns:r="http://schemas.openxmlformats.org/officeDocument/2006/relationships" xmlns:p="http://schemas.openxmlformats.org/presentationml/2006/main">
   <p:cSld>
     <p:spTree>
@@ -15381,13 +15710,13 @@
   <p:clrMapOvr>
     <a:masterClrMapping/>
   </p:clrMapOvr>
-  <mc:AlternateContent xmlns:mc="http://schemas.openxmlformats.org/markup-compatibility/2006">
-    <mc:Choice xmlns:p14="http://schemas.microsoft.com/office/powerpoint/2010/main" Requires="p14">
+  <mc:AlternateContent xmlns:mc="http://schemas.openxmlformats.org/markup-compatibility/2006" xmlns:p14="http://schemas.microsoft.com/office/powerpoint/2010/main">
+    <mc:Choice Requires="p14">
       <p:transition spd="slow" p14:dur="1400">
         <p14:doors dir="vert"/>
       </p:transition>
     </mc:Choice>
-    <mc:Fallback>
+    <mc:Fallback xmlns="">
       <p:transition spd="slow">
         <p:fade/>
       </p:transition>

</xml_diff>